<commit_message>
Adding Assignments for FileIO session
</commit_message>
<xml_diff>
--- a/Day2/Afternoon_FileIO/FileIO.pptx
+++ b/Day2/Afternoon_FileIO/FileIO.pptx
@@ -11,16 +11,19 @@
     <p:sldId id="259" r:id="rId5"/>
     <p:sldId id="260" r:id="rId6"/>
     <p:sldId id="261" r:id="rId7"/>
-    <p:sldId id="262" r:id="rId8"/>
-    <p:sldId id="263" r:id="rId9"/>
-    <p:sldId id="264" r:id="rId10"/>
-    <p:sldId id="265" r:id="rId11"/>
-    <p:sldId id="266" r:id="rId12"/>
-    <p:sldId id="267" r:id="rId13"/>
-    <p:sldId id="268" r:id="rId14"/>
-    <p:sldId id="269" r:id="rId15"/>
-    <p:sldId id="271" r:id="rId16"/>
-    <p:sldId id="270" r:id="rId17"/>
+    <p:sldId id="272" r:id="rId8"/>
+    <p:sldId id="262" r:id="rId9"/>
+    <p:sldId id="273" r:id="rId10"/>
+    <p:sldId id="263" r:id="rId11"/>
+    <p:sldId id="264" r:id="rId12"/>
+    <p:sldId id="265" r:id="rId13"/>
+    <p:sldId id="274" r:id="rId14"/>
+    <p:sldId id="266" r:id="rId15"/>
+    <p:sldId id="267" r:id="rId16"/>
+    <p:sldId id="268" r:id="rId17"/>
+    <p:sldId id="269" r:id="rId18"/>
+    <p:sldId id="271" r:id="rId19"/>
+    <p:sldId id="270" r:id="rId20"/>
   </p:sldIdLst>
   <p:sldSz cx="9144000" cy="6858000" type="screen4x3"/>
   <p:notesSz cx="6858000" cy="9144000"/>
@@ -3245,287 +3248,75 @@
               <a:rPr lang="en-US" dirty="0" smtClean="0">
                 <a:latin typeface="Times New Roman" charset="0"/>
               </a:rPr>
-              <a:t>File Streams (</a:t>
-            </a:r>
-            <a:r>
-              <a:rPr lang="en-US" sz="2800" dirty="0" smtClean="0">
-                <a:latin typeface="Times New Roman" charset="0"/>
-              </a:rPr>
-              <a:t>continued</a:t>
-            </a:r>
+              <a:t>DirectoryInfo and FileInfo Classes</a:t>
+            </a:r>
+            <a:endParaRPr lang="en-US" dirty="0"/>
+          </a:p>
+        </p:txBody>
+      </p:sp>
+      <p:sp>
+        <p:nvSpPr>
+          <p:cNvPr id="3" name="Content Placeholder 2"/>
+          <p:cNvSpPr>
+            <a:spLocks noGrp="1"/>
+          </p:cNvSpPr>
+          <p:nvPr>
+            <p:ph idx="1"/>
+          </p:nvPr>
+        </p:nvSpPr>
+        <p:spPr/>
+        <p:txBody>
+          <a:bodyPr/>
+          <a:lstStyle/>
+          <a:p>
             <a:r>
               <a:rPr lang="en-US" dirty="0" smtClean="0">
                 <a:latin typeface="Times New Roman" charset="0"/>
               </a:rPr>
-              <a:t>)</a:t>
-            </a:r>
-            <a:endParaRPr lang="en-US" dirty="0"/>
-          </a:p>
-        </p:txBody>
-      </p:sp>
-      <p:sp>
-        <p:nvSpPr>
-          <p:cNvPr id="3" name="Content Placeholder 2"/>
-          <p:cNvSpPr>
-            <a:spLocks noGrp="1"/>
-          </p:cNvSpPr>
-          <p:nvPr>
-            <p:ph idx="1"/>
-          </p:nvPr>
-        </p:nvSpPr>
-        <p:spPr/>
-        <p:txBody>
-          <a:bodyPr>
-            <a:normAutofit fontScale="62500" lnSpcReduction="20000"/>
-          </a:bodyPr>
-          <a:lstStyle/>
-          <a:p>
-            <a:pPr>
-              <a:spcBef>
-                <a:spcPct val="100000"/>
-              </a:spcBef>
-            </a:pPr>
-            <a:r>
-              <a:rPr lang="en-US" dirty="0" err="1" smtClean="0">
-                <a:latin typeface="Times New Roman" charset="0"/>
-              </a:rPr>
-              <a:t>StreamWriter</a:t>
+              <a:t>File/Directory </a:t>
+            </a:r>
+            <a:r>
+              <a:rPr lang="en-US" dirty="0">
+                <a:latin typeface="Times New Roman" charset="0"/>
+              </a:rPr>
+              <a:t>-</a:t>
             </a:r>
             <a:r>
               <a:rPr lang="en-US" dirty="0" smtClean="0">
                 <a:latin typeface="Times New Roman" charset="0"/>
               </a:rPr>
-              <a:t> class for write data to text file</a:t>
-            </a:r>
-          </a:p>
-          <a:p>
-            <a:pPr lvl="1">
-              <a:spcBef>
-                <a:spcPct val="100000"/>
-              </a:spcBef>
-            </a:pPr>
-            <a:r>
-              <a:rPr lang="en-US" sz="2600" dirty="0" smtClean="0">
-                <a:latin typeface="Times New Roman" charset="0"/>
-              </a:rPr>
-              <a:t>Includes implementations for Write( ) and </a:t>
-            </a:r>
-            <a:r>
-              <a:rPr lang="en-US" sz="2600" dirty="0" err="1" smtClean="0">
-                <a:latin typeface="Times New Roman" charset="0"/>
-              </a:rPr>
-              <a:t>WriteLine</a:t>
-            </a:r>
-            <a:r>
-              <a:rPr lang="en-US" sz="2600" dirty="0" smtClean="0">
-                <a:latin typeface="Times New Roman" charset="0"/>
-              </a:rPr>
-              <a:t>( ) </a:t>
-            </a:r>
-          </a:p>
-          <a:p>
-            <a:pPr>
-              <a:spcBef>
-                <a:spcPct val="100000"/>
-              </a:spcBef>
-            </a:pPr>
-            <a:r>
-              <a:rPr lang="en-US" dirty="0" err="1" smtClean="0">
-                <a:latin typeface="Times New Roman" charset="0"/>
-              </a:rPr>
-              <a:t>StreamReader</a:t>
-            </a:r>
+              <a:t> Static class</a:t>
+            </a:r>
+          </a:p>
+          <a:p>
             <a:r>
               <a:rPr lang="en-US" dirty="0" smtClean="0">
                 <a:latin typeface="Times New Roman" charset="0"/>
               </a:rPr>
-              <a:t> class to read or and from text files </a:t>
-            </a:r>
-          </a:p>
-          <a:p>
-            <a:pPr lvl="1">
-              <a:spcBef>
-                <a:spcPct val="100000"/>
-              </a:spcBef>
-            </a:pPr>
-            <a:r>
-              <a:rPr lang="en-US" sz="2600" dirty="0" smtClean="0">
-                <a:latin typeface="Times New Roman" charset="0"/>
-              </a:rPr>
-              <a:t>Includes implementations of Read( ) and </a:t>
-            </a:r>
-            <a:r>
-              <a:rPr lang="en-US" sz="2600" dirty="0" err="1" smtClean="0">
-                <a:latin typeface="Times New Roman" charset="0"/>
-              </a:rPr>
-              <a:t>ReadLine</a:t>
-            </a:r>
-            <a:r>
-              <a:rPr lang="en-US" sz="2600" dirty="0" smtClean="0">
-                <a:latin typeface="Times New Roman" charset="0"/>
-              </a:rPr>
-              <a:t>( ) </a:t>
-            </a:r>
-          </a:p>
-          <a:p>
-            <a:endParaRPr lang="en-US" dirty="0" smtClean="0"/>
-          </a:p>
-          <a:p>
-            <a:pPr lvl="1">
-              <a:lnSpc>
-                <a:spcPct val="88000"/>
-              </a:lnSpc>
-              <a:spcBef>
-                <a:spcPts val="700"/>
-              </a:spcBef>
-              <a:buNone/>
-            </a:pPr>
-            <a:r>
-              <a:rPr lang="en-US" sz="2600" dirty="0" err="1" smtClean="0">
-                <a:latin typeface="Times New Roman" charset="0"/>
-              </a:rPr>
-              <a:t>StreamWriter</a:t>
-            </a:r>
-            <a:r>
-              <a:rPr lang="en-US" sz="2600" dirty="0" smtClean="0">
-                <a:latin typeface="Times New Roman" charset="0"/>
-              </a:rPr>
-              <a:t> </a:t>
-            </a:r>
-            <a:r>
-              <a:rPr lang="en-US" sz="2600" dirty="0" err="1" smtClean="0">
-                <a:latin typeface="Times New Roman" charset="0"/>
-              </a:rPr>
-              <a:t>outputFile</a:t>
-            </a:r>
-            <a:r>
-              <a:rPr lang="en-US" sz="2600" dirty="0" smtClean="0">
-                <a:latin typeface="Times New Roman" charset="0"/>
-              </a:rPr>
-              <a:t> = </a:t>
-            </a:r>
-            <a:r>
-              <a:rPr lang="en-US" sz="2600" dirty="0" smtClean="0">
-                <a:solidFill>
-                  <a:schemeClr val="accent2"/>
-                </a:solidFill>
-                <a:latin typeface="Times New Roman" charset="0"/>
-              </a:rPr>
-              <a:t>new</a:t>
-            </a:r>
-            <a:r>
-              <a:rPr lang="en-US" sz="2600" dirty="0" smtClean="0">
-                <a:latin typeface="Times New Roman" charset="0"/>
-              </a:rPr>
-              <a:t> 						</a:t>
-            </a:r>
-            <a:r>
-              <a:rPr lang="en-US" sz="2600" dirty="0" err="1" smtClean="0">
-                <a:latin typeface="Times New Roman" charset="0"/>
-              </a:rPr>
-              <a:t>StreamWriter</a:t>
-            </a:r>
-            <a:r>
-              <a:rPr lang="en-US" sz="2600" dirty="0" smtClean="0">
-                <a:latin typeface="Times New Roman" charset="0"/>
-              </a:rPr>
-              <a:t>("</a:t>
-            </a:r>
-            <a:r>
-              <a:rPr lang="en-US" sz="2600" dirty="0" err="1" smtClean="0">
-                <a:latin typeface="Times New Roman" charset="0"/>
-              </a:rPr>
-              <a:t>someOutputFileName</a:t>
-            </a:r>
-            <a:r>
-              <a:rPr lang="en-US" sz="2600" dirty="0" smtClean="0">
-                <a:latin typeface="Times New Roman" charset="0"/>
-              </a:rPr>
-              <a:t>");</a:t>
-            </a:r>
-          </a:p>
-          <a:p>
-            <a:pPr lvl="1">
-              <a:lnSpc>
-                <a:spcPct val="88000"/>
-              </a:lnSpc>
-              <a:spcBef>
-                <a:spcPts val="700"/>
-              </a:spcBef>
-              <a:buNone/>
-            </a:pPr>
-            <a:r>
-              <a:rPr lang="en-US" sz="2600" dirty="0" err="1" smtClean="0">
-                <a:latin typeface="Times New Roman" charset="0"/>
-              </a:rPr>
-              <a:t>StreamReader</a:t>
-            </a:r>
-            <a:r>
-              <a:rPr lang="en-US" sz="2600" dirty="0" smtClean="0">
-                <a:latin typeface="Times New Roman" charset="0"/>
-              </a:rPr>
-              <a:t> </a:t>
-            </a:r>
-            <a:r>
-              <a:rPr lang="en-US" sz="2600" dirty="0" err="1" smtClean="0">
-                <a:latin typeface="Times New Roman" charset="0"/>
-              </a:rPr>
-              <a:t>inputFile</a:t>
-            </a:r>
-            <a:r>
-              <a:rPr lang="en-US" sz="2600" dirty="0" smtClean="0">
-                <a:latin typeface="Times New Roman" charset="0"/>
-              </a:rPr>
-              <a:t> = </a:t>
-            </a:r>
-            <a:r>
-              <a:rPr lang="en-US" sz="2600" dirty="0" smtClean="0">
-                <a:solidFill>
-                  <a:schemeClr val="accent2"/>
-                </a:solidFill>
-                <a:latin typeface="Times New Roman" charset="0"/>
-              </a:rPr>
-              <a:t>new</a:t>
-            </a:r>
-            <a:r>
-              <a:rPr lang="en-US" sz="2600" dirty="0" smtClean="0">
-                <a:latin typeface="Times New Roman" charset="0"/>
-              </a:rPr>
-              <a:t> 						</a:t>
-            </a:r>
-            <a:r>
-              <a:rPr lang="en-US" sz="2600" dirty="0" err="1" smtClean="0">
-                <a:latin typeface="Times New Roman" charset="0"/>
-              </a:rPr>
-              <a:t>StreamReader</a:t>
-            </a:r>
-            <a:r>
-              <a:rPr lang="en-US" sz="2600" dirty="0" smtClean="0">
-                <a:latin typeface="Times New Roman" charset="0"/>
-              </a:rPr>
-              <a:t>("</a:t>
-            </a:r>
-            <a:r>
-              <a:rPr lang="en-US" sz="2600" dirty="0" err="1" smtClean="0">
-                <a:latin typeface="Times New Roman" charset="0"/>
-              </a:rPr>
-              <a:t>someInputFileName</a:t>
-            </a:r>
-            <a:r>
-              <a:rPr lang="en-US" sz="2600" dirty="0" smtClean="0">
-                <a:latin typeface="Times New Roman" charset="0"/>
-              </a:rPr>
-              <a:t>");</a:t>
-            </a:r>
-          </a:p>
-          <a:p>
-            <a:pPr lvl="1">
-              <a:lnSpc>
-                <a:spcPct val="88000"/>
-              </a:lnSpc>
-              <a:spcBef>
-                <a:spcPts val="700"/>
-              </a:spcBef>
+              <a:t>FileInfo/DirectoryInfo - Instance </a:t>
+            </a:r>
+            <a:endParaRPr lang="en-US" dirty="0" smtClean="0">
+              <a:latin typeface="Times New Roman" charset="0"/>
+            </a:endParaRPr>
+          </a:p>
+          <a:p>
+            <a:r>
+              <a:rPr lang="en-US" dirty="0" smtClean="0">
+                <a:latin typeface="Times New Roman" charset="0"/>
+              </a:rPr>
+              <a:t>Use File while performing single operations</a:t>
+            </a:r>
+          </a:p>
+          <a:p>
+            <a:r>
+              <a:rPr lang="en-US" dirty="0" smtClean="0">
+                <a:latin typeface="Times New Roman" charset="0"/>
+              </a:rPr>
+              <a:t>Use FileInfo – Multiple operations</a:t>
+            </a:r>
+          </a:p>
+          <a:p>
+            <a:pPr marL="457200" lvl="1" indent="0">
               <a:buNone/>
             </a:pPr>
             <a:endParaRPr lang="en-US" dirty="0" smtClean="0">
@@ -3533,150 +3324,15 @@
             </a:endParaRPr>
           </a:p>
           <a:p>
-            <a:pPr>
-              <a:lnSpc>
-                <a:spcPct val="88000"/>
-              </a:lnSpc>
-              <a:spcBef>
-                <a:spcPts val="900"/>
-              </a:spcBef>
+            <a:pPr marL="457200" lvl="1" indent="0">
+              <a:buNone/>
             </a:pPr>
             <a:r>
               <a:rPr lang="en-US" dirty="0" smtClean="0">
                 <a:latin typeface="Times New Roman" charset="0"/>
               </a:rPr>
-              <a:t>Use Write( ) or </a:t>
-            </a:r>
-            <a:r>
-              <a:rPr lang="en-US" dirty="0" err="1" smtClean="0">
-                <a:latin typeface="Times New Roman" charset="0"/>
-              </a:rPr>
-              <a:t>WriteLine</a:t>
-            </a:r>
-            <a:r>
-              <a:rPr lang="en-US" dirty="0" smtClean="0">
-                <a:latin typeface="Times New Roman" charset="0"/>
-              </a:rPr>
-              <a:t>( ) with the instantiated stream object </a:t>
-            </a:r>
-          </a:p>
-          <a:p>
-            <a:pPr lvl="1">
-              <a:lnSpc>
-                <a:spcPct val="88000"/>
-              </a:lnSpc>
-              <a:spcBef>
-                <a:spcPts val="900"/>
-              </a:spcBef>
-              <a:buNone/>
-            </a:pPr>
-            <a:r>
-              <a:rPr lang="en-US" dirty="0" smtClean="0">
-                <a:latin typeface="Times New Roman" charset="0"/>
-              </a:rPr>
-              <a:t>	</a:t>
-            </a:r>
-            <a:r>
-              <a:rPr lang="en-US" dirty="0" err="1" smtClean="0">
-                <a:latin typeface="Times New Roman" charset="0"/>
-              </a:rPr>
-              <a:t>outputFile.WriteLine</a:t>
-            </a:r>
-            <a:r>
-              <a:rPr lang="en-US" dirty="0" smtClean="0">
-                <a:latin typeface="Times New Roman" charset="0"/>
-              </a:rPr>
-              <a:t>("This is the first line in a text file");</a:t>
-            </a:r>
-          </a:p>
-          <a:p>
-            <a:pPr>
-              <a:lnSpc>
-                <a:spcPct val="88000"/>
-              </a:lnSpc>
-              <a:spcBef>
-                <a:spcPts val="900"/>
-              </a:spcBef>
-            </a:pPr>
-            <a:r>
-              <a:rPr lang="en-US" dirty="0" smtClean="0">
-                <a:latin typeface="Times New Roman" charset="0"/>
-              </a:rPr>
-              <a:t>Use Read( ) or </a:t>
-            </a:r>
-            <a:r>
-              <a:rPr lang="en-US" dirty="0" err="1" smtClean="0">
-                <a:latin typeface="Times New Roman" charset="0"/>
-              </a:rPr>
-              <a:t>ReadLine</a:t>
-            </a:r>
-            <a:r>
-              <a:rPr lang="en-US" dirty="0" smtClean="0">
-                <a:latin typeface="Times New Roman" charset="0"/>
-              </a:rPr>
-              <a:t>( ) with the instantiated stream object </a:t>
-            </a:r>
-          </a:p>
-          <a:p>
-            <a:pPr lvl="1">
-              <a:lnSpc>
-                <a:spcPct val="88000"/>
-              </a:lnSpc>
-              <a:spcBef>
-                <a:spcPts val="900"/>
-              </a:spcBef>
-              <a:buNone/>
-            </a:pPr>
-            <a:r>
-              <a:rPr lang="en-US" dirty="0" smtClean="0">
-                <a:solidFill>
-                  <a:schemeClr val="accent2"/>
-                </a:solidFill>
-                <a:latin typeface="Times New Roman" charset="0"/>
-              </a:rPr>
-              <a:t>	string</a:t>
-            </a:r>
-            <a:r>
-              <a:rPr lang="en-US" dirty="0" smtClean="0">
-                <a:latin typeface="Times New Roman" charset="0"/>
-              </a:rPr>
-              <a:t> </a:t>
-            </a:r>
-            <a:r>
-              <a:rPr lang="en-US" dirty="0" err="1" smtClean="0">
-                <a:latin typeface="Times New Roman" charset="0"/>
-              </a:rPr>
-              <a:t>inValue</a:t>
-            </a:r>
-            <a:r>
-              <a:rPr lang="en-US" dirty="0" smtClean="0">
-                <a:latin typeface="Times New Roman" charset="0"/>
-              </a:rPr>
-              <a:t> = </a:t>
-            </a:r>
-            <a:r>
-              <a:rPr lang="en-US" dirty="0" err="1" smtClean="0">
-                <a:latin typeface="Times New Roman" charset="0"/>
-              </a:rPr>
-              <a:t>inputFile.ReadLine</a:t>
-            </a:r>
-            <a:r>
-              <a:rPr lang="en-US" dirty="0" smtClean="0">
-                <a:latin typeface="Times New Roman" charset="0"/>
-              </a:rPr>
-              <a:t>( );</a:t>
-            </a:r>
-          </a:p>
-          <a:p>
-            <a:pPr lvl="1">
-              <a:lnSpc>
-                <a:spcPct val="88000"/>
-              </a:lnSpc>
-              <a:spcBef>
-                <a:spcPts val="700"/>
-              </a:spcBef>
-              <a:buNone/>
-            </a:pPr>
+              <a:t>Reason: Security checking done while accessing the file</a:t>
+            </a:r>
             <a:endParaRPr lang="en-US" dirty="0" smtClean="0">
               <a:latin typeface="Times New Roman" charset="0"/>
             </a:endParaRPr>
@@ -3686,36 +3342,10 @@
           </a:p>
         </p:txBody>
       </p:sp>
-      <p:sp>
-        <p:nvSpPr>
-          <p:cNvPr id="4" name="TextBox 3"/>
-          <p:cNvSpPr txBox="1"/>
-          <p:nvPr/>
-        </p:nvSpPr>
-        <p:spPr>
-          <a:xfrm>
-            <a:off x="-3579252" y="2408342"/>
-            <a:ext cx="184666" cy="369332"/>
-          </a:xfrm>
-          <a:prstGeom prst="rect">
-            <a:avLst/>
-          </a:prstGeom>
-          <a:noFill/>
-        </p:spPr>
-        <p:txBody>
-          <a:bodyPr wrap="none" rtlCol="0">
-            <a:spAutoFit/>
-          </a:bodyPr>
-          <a:lstStyle/>
-          <a:p>
-            <a:endParaRPr lang="en-US" dirty="0"/>
-          </a:p>
-        </p:txBody>
-      </p:sp>
     </p:spTree>
     <p:extLst>
       <p:ext uri="{BB962C8B-B14F-4D97-AF65-F5344CB8AC3E}">
-        <p14:creationId xmlns:p14="http://schemas.microsoft.com/office/powerpoint/2010/main" val="3982861813"/>
+        <p14:creationId xmlns:p14="http://schemas.microsoft.com/office/powerpoint/2010/main" val="3762960559"/>
       </p:ext>
     </p:extLst>
   </p:cSld>
@@ -3765,8 +3395,10 @@
           <a:lstStyle/>
           <a:p>
             <a:r>
-              <a:rPr lang="en-US" dirty="0" smtClean="0"/>
-              <a:t>Exceptions</a:t>
+              <a:rPr lang="en-US" dirty="0" smtClean="0">
+                <a:latin typeface="Times New Roman" charset="0"/>
+              </a:rPr>
+              <a:t>File Streams</a:t>
             </a:r>
             <a:endParaRPr lang="en-US" dirty="0"/>
           </a:p>
@@ -3784,58 +3416,226 @@
         </p:nvSpPr>
         <p:spPr/>
         <p:txBody>
-          <a:bodyPr/>
+          <a:bodyPr>
+            <a:normAutofit lnSpcReduction="10000"/>
+          </a:bodyPr>
           <a:lstStyle/>
           <a:p>
-            <a:pPr marL="342900" lvl="1" indent="-342900">
-              <a:buFont typeface="Arial"/>
-              <a:buChar char="•"/>
+            <a:pPr>
+              <a:lnSpc>
+                <a:spcPct val="90000"/>
+              </a:lnSpc>
+              <a:spcBef>
+                <a:spcPct val="50000"/>
+              </a:spcBef>
             </a:pPr>
             <a:r>
               <a:rPr lang="en-US" dirty="0" smtClean="0">
                 <a:latin typeface="Times New Roman" charset="0"/>
               </a:rPr>
-              <a:t>FileNotFoundException</a:t>
+              <a:t>Several abstract classes for dealing with files</a:t>
+            </a:r>
+          </a:p>
+          <a:p>
+            <a:pPr lvl="2">
+              <a:lnSpc>
+                <a:spcPct val="90000"/>
+              </a:lnSpc>
+              <a:spcBef>
+                <a:spcPct val="50000"/>
+              </a:spcBef>
+            </a:pPr>
+            <a:r>
+              <a:rPr lang="en-US" sz="2600" dirty="0" smtClean="0">
+                <a:latin typeface="Times New Roman" charset="0"/>
+              </a:rPr>
+              <a:t>Stream, </a:t>
+            </a:r>
+            <a:r>
+              <a:rPr lang="en-US" sz="2600" dirty="0" err="1" smtClean="0">
+                <a:latin typeface="Times New Roman" charset="0"/>
+              </a:rPr>
+              <a:t>TextWriter</a:t>
+            </a:r>
+            <a:r>
+              <a:rPr lang="en-US" sz="2600" dirty="0" smtClean="0">
+                <a:latin typeface="Times New Roman" charset="0"/>
+              </a:rPr>
+              <a:t>, and </a:t>
+            </a:r>
+            <a:r>
+              <a:rPr lang="en-US" sz="2600" dirty="0" err="1" smtClean="0">
+                <a:latin typeface="Times New Roman" charset="0"/>
+              </a:rPr>
+              <a:t>TextReader</a:t>
+            </a:r>
+            <a:r>
+              <a:rPr lang="en-US" dirty="0" smtClean="0">
+                <a:latin typeface="Times New Roman" charset="0"/>
+              </a:rPr>
+              <a:t> </a:t>
+            </a:r>
+          </a:p>
+          <a:p>
+            <a:pPr>
+              <a:lnSpc>
+                <a:spcPct val="90000"/>
+              </a:lnSpc>
+              <a:spcBef>
+                <a:spcPct val="50000"/>
+              </a:spcBef>
+            </a:pPr>
+            <a:r>
+              <a:rPr lang="en-US" dirty="0" smtClean="0">
+                <a:latin typeface="Times New Roman" charset="0"/>
+              </a:rPr>
+              <a:t>Stream classes provide generic methods for dealing with input/output</a:t>
+            </a:r>
+          </a:p>
+          <a:p>
+            <a:pPr lvl="1">
+              <a:lnSpc>
+                <a:spcPct val="90000"/>
+              </a:lnSpc>
+              <a:spcBef>
+                <a:spcPct val="50000"/>
+              </a:spcBef>
+            </a:pPr>
+            <a:r>
+              <a:rPr lang="en-US" sz="2600" dirty="0" err="1" smtClean="0">
+                <a:latin typeface="Times New Roman" charset="0"/>
+              </a:rPr>
+              <a:t>IO.Stream</a:t>
+            </a:r>
+            <a:r>
+              <a:rPr lang="en-US" sz="2600" dirty="0" smtClean="0">
+                <a:latin typeface="Times New Roman" charset="0"/>
+              </a:rPr>
+              <a:t> class and its subclasses</a:t>
+            </a:r>
+            <a:r>
+              <a:rPr lang="en-US" sz="2600" dirty="0" smtClean="0">
+                <a:latin typeface="Times New Roman" charset="0"/>
+                <a:cs typeface="Times New Roman" charset="0"/>
+              </a:rPr>
+              <a:t> </a:t>
+            </a:r>
+            <a:r>
+              <a:rPr lang="en-US" dirty="0">
+                <a:latin typeface="Times New Roman" charset="0"/>
+              </a:rPr>
+              <a:t>– </a:t>
+            </a:r>
+            <a:r>
+              <a:rPr lang="en-US" sz="2600" dirty="0" smtClean="0">
+                <a:latin typeface="Times New Roman" charset="0"/>
+              </a:rPr>
+              <a:t>byte-level data</a:t>
+            </a:r>
+          </a:p>
+          <a:p>
+            <a:pPr lvl="1">
+              <a:lnSpc>
+                <a:spcPct val="90000"/>
+              </a:lnSpc>
+              <a:spcBef>
+                <a:spcPct val="50000"/>
+              </a:spcBef>
+            </a:pPr>
+            <a:r>
+              <a:rPr lang="en-US" sz="2600" dirty="0" err="1" smtClean="0">
+                <a:latin typeface="Times New Roman" charset="0"/>
+              </a:rPr>
+              <a:t>IO.TextWriter</a:t>
+            </a:r>
+            <a:r>
+              <a:rPr lang="en-US" sz="2600" dirty="0" smtClean="0">
+                <a:latin typeface="Times New Roman" charset="0"/>
+              </a:rPr>
+              <a:t> and </a:t>
+            </a:r>
+            <a:r>
+              <a:rPr lang="en-US" sz="2600" dirty="0" err="1" smtClean="0">
+                <a:latin typeface="Times New Roman" charset="0"/>
+              </a:rPr>
+              <a:t>IO.TextReader</a:t>
+            </a:r>
+            <a:r>
+              <a:rPr lang="en-US" sz="2600" dirty="0" smtClean="0">
+                <a:latin typeface="Times New Roman" charset="0"/>
+                <a:cs typeface="Times New Roman" charset="0"/>
+              </a:rPr>
+              <a:t> </a:t>
+            </a:r>
+            <a:r>
+              <a:rPr lang="en-US" dirty="0">
+                <a:latin typeface="Times New Roman" charset="0"/>
+              </a:rPr>
+              <a:t>– </a:t>
+            </a:r>
+            <a:r>
+              <a:rPr lang="en-US" sz="2600" dirty="0" smtClean="0">
+                <a:latin typeface="Times New Roman" charset="0"/>
+              </a:rPr>
+              <a:t>data in a text (readable) format     </a:t>
+            </a:r>
+          </a:p>
+          <a:p>
+            <a:pPr lvl="2">
+              <a:lnSpc>
+                <a:spcPct val="90000"/>
+              </a:lnSpc>
+              <a:spcBef>
+                <a:spcPct val="50000"/>
+              </a:spcBef>
+            </a:pPr>
+            <a:r>
+              <a:rPr lang="en-US" dirty="0" err="1">
+                <a:latin typeface="Times New Roman" charset="0"/>
+              </a:rPr>
+              <a:t>StreamReader</a:t>
+            </a:r>
+            <a:r>
+              <a:rPr lang="en-US" dirty="0">
+                <a:latin typeface="Times New Roman" charset="0"/>
+              </a:rPr>
+              <a:t> and </a:t>
+            </a:r>
+            <a:r>
+              <a:rPr lang="en-US" dirty="0" err="1">
+                <a:latin typeface="Times New Roman" charset="0"/>
+              </a:rPr>
+              <a:t>StreamWriter</a:t>
+            </a:r>
+            <a:r>
+              <a:rPr lang="en-US" dirty="0">
+                <a:latin typeface="Times New Roman" charset="0"/>
+              </a:rPr>
+              <a:t> derived classes of </a:t>
+            </a:r>
+            <a:r>
+              <a:rPr lang="en-US" dirty="0" err="1">
+                <a:latin typeface="Times New Roman" charset="0"/>
+              </a:rPr>
+              <a:t>IO.TextWriter</a:t>
+            </a:r>
+            <a:r>
+              <a:rPr lang="en-US" dirty="0">
+                <a:latin typeface="Times New Roman" charset="0"/>
+              </a:rPr>
+              <a:t> and </a:t>
+            </a:r>
+            <a:r>
+              <a:rPr lang="en-US" dirty="0" err="1">
+                <a:latin typeface="Times New Roman" charset="0"/>
+              </a:rPr>
+              <a:t>IO.TextReader</a:t>
             </a:r>
             <a:endParaRPr lang="en-US" dirty="0">
               <a:latin typeface="Times New Roman" charset="0"/>
             </a:endParaRPr>
           </a:p>
           <a:p>
-            <a:pPr marL="342900" lvl="1" indent="-342900">
-              <a:buFont typeface="Arial"/>
-              <a:buChar char="•"/>
-            </a:pPr>
-            <a:r>
-              <a:rPr lang="en-US" dirty="0" smtClean="0">
-                <a:latin typeface="Times New Roman" charset="0"/>
-              </a:rPr>
-              <a:t>DirectoryNotFoundException</a:t>
-            </a:r>
-            <a:endParaRPr lang="en-US" dirty="0">
-              <a:latin typeface="Times New Roman" charset="0"/>
-            </a:endParaRPr>
-          </a:p>
-          <a:p>
-            <a:pPr marL="342900" lvl="1" indent="-342900">
-              <a:buFont typeface="Arial"/>
-              <a:buChar char="•"/>
-            </a:pPr>
-            <a:r>
-              <a:rPr lang="en-US" dirty="0" smtClean="0">
-                <a:latin typeface="Times New Roman" charset="0"/>
-              </a:rPr>
-              <a:t>App Crashes</a:t>
-            </a:r>
-          </a:p>
-          <a:p>
-            <a:pPr marL="742950" lvl="2" indent="-342900"/>
-            <a:r>
-              <a:rPr lang="en-US" dirty="0" smtClean="0">
-                <a:latin typeface="Times New Roman" charset="0"/>
-              </a:rPr>
-              <a:t>Dispose/Close the streams</a:t>
-            </a:r>
             <a:endParaRPr lang="en-US" dirty="0"/>
           </a:p>
         </p:txBody>
@@ -3843,7 +3643,7 @@
     </p:spTree>
     <p:extLst>
       <p:ext uri="{BB962C8B-B14F-4D97-AF65-F5344CB8AC3E}">
-        <p14:creationId xmlns:p14="http://schemas.microsoft.com/office/powerpoint/2010/main" val="3269607516"/>
+        <p14:creationId xmlns:p14="http://schemas.microsoft.com/office/powerpoint/2010/main" val="3346148235"/>
       </p:ext>
     </p:extLst>
   </p:cSld>
@@ -3896,6 +3696,1047 @@
               <a:rPr lang="en-US" dirty="0" smtClean="0">
                 <a:latin typeface="Times New Roman" charset="0"/>
               </a:rPr>
+              <a:t>File Streams (</a:t>
+            </a:r>
+            <a:r>
+              <a:rPr lang="en-US" sz="2800" dirty="0" smtClean="0">
+                <a:latin typeface="Times New Roman" charset="0"/>
+              </a:rPr>
+              <a:t>continued</a:t>
+            </a:r>
+            <a:r>
+              <a:rPr lang="en-US" dirty="0" smtClean="0">
+                <a:latin typeface="Times New Roman" charset="0"/>
+              </a:rPr>
+              <a:t>)</a:t>
+            </a:r>
+            <a:endParaRPr lang="en-US" dirty="0"/>
+          </a:p>
+        </p:txBody>
+      </p:sp>
+      <p:sp>
+        <p:nvSpPr>
+          <p:cNvPr id="3" name="Content Placeholder 2"/>
+          <p:cNvSpPr>
+            <a:spLocks noGrp="1"/>
+          </p:cNvSpPr>
+          <p:nvPr>
+            <p:ph idx="1"/>
+          </p:nvPr>
+        </p:nvSpPr>
+        <p:spPr/>
+        <p:txBody>
+          <a:bodyPr>
+            <a:normAutofit fontScale="62500" lnSpcReduction="20000"/>
+          </a:bodyPr>
+          <a:lstStyle/>
+          <a:p>
+            <a:pPr>
+              <a:spcBef>
+                <a:spcPct val="100000"/>
+              </a:spcBef>
+            </a:pPr>
+            <a:r>
+              <a:rPr lang="en-US" dirty="0" err="1" smtClean="0">
+                <a:latin typeface="Times New Roman" charset="0"/>
+              </a:rPr>
+              <a:t>StreamWriter</a:t>
+            </a:r>
+            <a:r>
+              <a:rPr lang="en-US" dirty="0" smtClean="0">
+                <a:latin typeface="Times New Roman" charset="0"/>
+              </a:rPr>
+              <a:t> class for write data to text file</a:t>
+            </a:r>
+          </a:p>
+          <a:p>
+            <a:pPr lvl="1">
+              <a:spcBef>
+                <a:spcPct val="100000"/>
+              </a:spcBef>
+            </a:pPr>
+            <a:r>
+              <a:rPr lang="en-US" sz="2600" dirty="0" smtClean="0">
+                <a:latin typeface="Times New Roman" charset="0"/>
+              </a:rPr>
+              <a:t>Includes implementations for Write( ) and </a:t>
+            </a:r>
+            <a:r>
+              <a:rPr lang="en-US" sz="2600" dirty="0" err="1" smtClean="0">
+                <a:latin typeface="Times New Roman" charset="0"/>
+              </a:rPr>
+              <a:t>WriteLine</a:t>
+            </a:r>
+            <a:r>
+              <a:rPr lang="en-US" sz="2600" dirty="0" smtClean="0">
+                <a:latin typeface="Times New Roman" charset="0"/>
+              </a:rPr>
+              <a:t>( ) </a:t>
+            </a:r>
+          </a:p>
+          <a:p>
+            <a:pPr>
+              <a:spcBef>
+                <a:spcPct val="100000"/>
+              </a:spcBef>
+            </a:pPr>
+            <a:r>
+              <a:rPr lang="en-US" dirty="0" err="1" smtClean="0">
+                <a:latin typeface="Times New Roman" charset="0"/>
+              </a:rPr>
+              <a:t>StreamReader</a:t>
+            </a:r>
+            <a:r>
+              <a:rPr lang="en-US" dirty="0" smtClean="0">
+                <a:latin typeface="Times New Roman" charset="0"/>
+              </a:rPr>
+              <a:t> class to read or and from text files </a:t>
+            </a:r>
+          </a:p>
+          <a:p>
+            <a:pPr lvl="1">
+              <a:spcBef>
+                <a:spcPct val="100000"/>
+              </a:spcBef>
+            </a:pPr>
+            <a:r>
+              <a:rPr lang="en-US" sz="2600" dirty="0" smtClean="0">
+                <a:latin typeface="Times New Roman" charset="0"/>
+              </a:rPr>
+              <a:t>Includes implementations of Read( ) and </a:t>
+            </a:r>
+            <a:r>
+              <a:rPr lang="en-US" sz="2600" dirty="0" err="1" smtClean="0">
+                <a:latin typeface="Times New Roman" charset="0"/>
+              </a:rPr>
+              <a:t>ReadLine</a:t>
+            </a:r>
+            <a:r>
+              <a:rPr lang="en-US" sz="2600" dirty="0" smtClean="0">
+                <a:latin typeface="Times New Roman" charset="0"/>
+              </a:rPr>
+              <a:t>( ) </a:t>
+            </a:r>
+          </a:p>
+          <a:p>
+            <a:endParaRPr lang="en-US" dirty="0" smtClean="0"/>
+          </a:p>
+          <a:p>
+            <a:pPr lvl="1">
+              <a:lnSpc>
+                <a:spcPct val="88000"/>
+              </a:lnSpc>
+              <a:spcBef>
+                <a:spcPts val="700"/>
+              </a:spcBef>
+              <a:buNone/>
+            </a:pPr>
+            <a:r>
+              <a:rPr lang="en-US" sz="2600" dirty="0" err="1" smtClean="0">
+                <a:latin typeface="Times New Roman" charset="0"/>
+              </a:rPr>
+              <a:t>StreamWriter</a:t>
+            </a:r>
+            <a:r>
+              <a:rPr lang="en-US" sz="2600" dirty="0" smtClean="0">
+                <a:latin typeface="Times New Roman" charset="0"/>
+              </a:rPr>
+              <a:t> </a:t>
+            </a:r>
+            <a:r>
+              <a:rPr lang="en-US" sz="2600" dirty="0" err="1" smtClean="0">
+                <a:latin typeface="Times New Roman" charset="0"/>
+              </a:rPr>
+              <a:t>outputFile</a:t>
+            </a:r>
+            <a:r>
+              <a:rPr lang="en-US" sz="2600" dirty="0" smtClean="0">
+                <a:latin typeface="Times New Roman" charset="0"/>
+              </a:rPr>
+              <a:t> = </a:t>
+            </a:r>
+            <a:r>
+              <a:rPr lang="en-US" sz="2600" dirty="0" smtClean="0">
+                <a:solidFill>
+                  <a:schemeClr val="accent2"/>
+                </a:solidFill>
+                <a:latin typeface="Times New Roman" charset="0"/>
+              </a:rPr>
+              <a:t>new</a:t>
+            </a:r>
+            <a:r>
+              <a:rPr lang="en-US" sz="2600" dirty="0" smtClean="0">
+                <a:latin typeface="Times New Roman" charset="0"/>
+              </a:rPr>
+              <a:t> 						</a:t>
+            </a:r>
+            <a:r>
+              <a:rPr lang="en-US" sz="2600" dirty="0" err="1" smtClean="0">
+                <a:latin typeface="Times New Roman" charset="0"/>
+              </a:rPr>
+              <a:t>StreamWriter</a:t>
+            </a:r>
+            <a:r>
+              <a:rPr lang="en-US" sz="2600" dirty="0" smtClean="0">
+                <a:latin typeface="Times New Roman" charset="0"/>
+              </a:rPr>
+              <a:t>("</a:t>
+            </a:r>
+            <a:r>
+              <a:rPr lang="en-US" sz="2600" dirty="0" err="1" smtClean="0">
+                <a:latin typeface="Times New Roman" charset="0"/>
+              </a:rPr>
+              <a:t>someOutputFileName</a:t>
+            </a:r>
+            <a:r>
+              <a:rPr lang="en-US" sz="2600" dirty="0" smtClean="0">
+                <a:latin typeface="Times New Roman" charset="0"/>
+              </a:rPr>
+              <a:t>");</a:t>
+            </a:r>
+          </a:p>
+          <a:p>
+            <a:pPr lvl="1">
+              <a:lnSpc>
+                <a:spcPct val="88000"/>
+              </a:lnSpc>
+              <a:spcBef>
+                <a:spcPts val="700"/>
+              </a:spcBef>
+              <a:buNone/>
+            </a:pPr>
+            <a:r>
+              <a:rPr lang="en-US" sz="2600" dirty="0" err="1" smtClean="0">
+                <a:latin typeface="Times New Roman" charset="0"/>
+              </a:rPr>
+              <a:t>StreamReader</a:t>
+            </a:r>
+            <a:r>
+              <a:rPr lang="en-US" sz="2600" dirty="0" smtClean="0">
+                <a:latin typeface="Times New Roman" charset="0"/>
+              </a:rPr>
+              <a:t> </a:t>
+            </a:r>
+            <a:r>
+              <a:rPr lang="en-US" sz="2600" dirty="0" err="1" smtClean="0">
+                <a:latin typeface="Times New Roman" charset="0"/>
+              </a:rPr>
+              <a:t>inputFile</a:t>
+            </a:r>
+            <a:r>
+              <a:rPr lang="en-US" sz="2600" dirty="0" smtClean="0">
+                <a:latin typeface="Times New Roman" charset="0"/>
+              </a:rPr>
+              <a:t> = </a:t>
+            </a:r>
+            <a:r>
+              <a:rPr lang="en-US" sz="2600" dirty="0" smtClean="0">
+                <a:solidFill>
+                  <a:schemeClr val="accent2"/>
+                </a:solidFill>
+                <a:latin typeface="Times New Roman" charset="0"/>
+              </a:rPr>
+              <a:t>new</a:t>
+            </a:r>
+            <a:r>
+              <a:rPr lang="en-US" sz="2600" dirty="0" smtClean="0">
+                <a:latin typeface="Times New Roman" charset="0"/>
+              </a:rPr>
+              <a:t> 						</a:t>
+            </a:r>
+            <a:r>
+              <a:rPr lang="en-US" sz="2600" dirty="0" err="1" smtClean="0">
+                <a:latin typeface="Times New Roman" charset="0"/>
+              </a:rPr>
+              <a:t>StreamReader</a:t>
+            </a:r>
+            <a:r>
+              <a:rPr lang="en-US" sz="2600" dirty="0" smtClean="0">
+                <a:latin typeface="Times New Roman" charset="0"/>
+              </a:rPr>
+              <a:t>("</a:t>
+            </a:r>
+            <a:r>
+              <a:rPr lang="en-US" sz="2600" dirty="0" err="1" smtClean="0">
+                <a:latin typeface="Times New Roman" charset="0"/>
+              </a:rPr>
+              <a:t>someInputFileName</a:t>
+            </a:r>
+            <a:r>
+              <a:rPr lang="en-US" sz="2600" dirty="0" smtClean="0">
+                <a:latin typeface="Times New Roman" charset="0"/>
+              </a:rPr>
+              <a:t>");</a:t>
+            </a:r>
+          </a:p>
+          <a:p>
+            <a:pPr lvl="1">
+              <a:lnSpc>
+                <a:spcPct val="88000"/>
+              </a:lnSpc>
+              <a:spcBef>
+                <a:spcPts val="700"/>
+              </a:spcBef>
+              <a:buNone/>
+            </a:pPr>
+            <a:endParaRPr lang="en-US" dirty="0" smtClean="0">
+              <a:latin typeface="Times New Roman" charset="0"/>
+            </a:endParaRPr>
+          </a:p>
+          <a:p>
+            <a:pPr>
+              <a:lnSpc>
+                <a:spcPct val="88000"/>
+              </a:lnSpc>
+              <a:spcBef>
+                <a:spcPts val="900"/>
+              </a:spcBef>
+            </a:pPr>
+            <a:r>
+              <a:rPr lang="en-US" dirty="0" smtClean="0">
+                <a:latin typeface="Times New Roman" charset="0"/>
+              </a:rPr>
+              <a:t>Use Write( ) or </a:t>
+            </a:r>
+            <a:r>
+              <a:rPr lang="en-US" dirty="0" err="1" smtClean="0">
+                <a:latin typeface="Times New Roman" charset="0"/>
+              </a:rPr>
+              <a:t>WriteLine</a:t>
+            </a:r>
+            <a:r>
+              <a:rPr lang="en-US" dirty="0" smtClean="0">
+                <a:latin typeface="Times New Roman" charset="0"/>
+              </a:rPr>
+              <a:t>( ) with the instantiated stream object </a:t>
+            </a:r>
+          </a:p>
+          <a:p>
+            <a:pPr lvl="1">
+              <a:lnSpc>
+                <a:spcPct val="88000"/>
+              </a:lnSpc>
+              <a:spcBef>
+                <a:spcPts val="900"/>
+              </a:spcBef>
+              <a:buNone/>
+            </a:pPr>
+            <a:r>
+              <a:rPr lang="en-US" dirty="0" smtClean="0">
+                <a:latin typeface="Times New Roman" charset="0"/>
+              </a:rPr>
+              <a:t>	</a:t>
+            </a:r>
+            <a:r>
+              <a:rPr lang="en-US" dirty="0" err="1" smtClean="0">
+                <a:latin typeface="Times New Roman" charset="0"/>
+              </a:rPr>
+              <a:t>outputFile.WriteLine</a:t>
+            </a:r>
+            <a:r>
+              <a:rPr lang="en-US" dirty="0" smtClean="0">
+                <a:latin typeface="Times New Roman" charset="0"/>
+              </a:rPr>
+              <a:t>("This is the first line in a text file");</a:t>
+            </a:r>
+          </a:p>
+          <a:p>
+            <a:pPr>
+              <a:lnSpc>
+                <a:spcPct val="88000"/>
+              </a:lnSpc>
+              <a:spcBef>
+                <a:spcPts val="900"/>
+              </a:spcBef>
+            </a:pPr>
+            <a:r>
+              <a:rPr lang="en-US" dirty="0" smtClean="0">
+                <a:latin typeface="Times New Roman" charset="0"/>
+              </a:rPr>
+              <a:t>Use Read( ) or </a:t>
+            </a:r>
+            <a:r>
+              <a:rPr lang="en-US" dirty="0" err="1" smtClean="0">
+                <a:latin typeface="Times New Roman" charset="0"/>
+              </a:rPr>
+              <a:t>ReadLine</a:t>
+            </a:r>
+            <a:r>
+              <a:rPr lang="en-US" dirty="0" smtClean="0">
+                <a:latin typeface="Times New Roman" charset="0"/>
+              </a:rPr>
+              <a:t>( ) with the instantiated stream object </a:t>
+            </a:r>
+          </a:p>
+          <a:p>
+            <a:pPr lvl="1">
+              <a:lnSpc>
+                <a:spcPct val="88000"/>
+              </a:lnSpc>
+              <a:spcBef>
+                <a:spcPts val="900"/>
+              </a:spcBef>
+              <a:buNone/>
+            </a:pPr>
+            <a:r>
+              <a:rPr lang="en-US" dirty="0" smtClean="0">
+                <a:solidFill>
+                  <a:schemeClr val="accent2"/>
+                </a:solidFill>
+                <a:latin typeface="Times New Roman" charset="0"/>
+              </a:rPr>
+              <a:t>	string</a:t>
+            </a:r>
+            <a:r>
+              <a:rPr lang="en-US" dirty="0" smtClean="0">
+                <a:latin typeface="Times New Roman" charset="0"/>
+              </a:rPr>
+              <a:t> </a:t>
+            </a:r>
+            <a:r>
+              <a:rPr lang="en-US" dirty="0" err="1" smtClean="0">
+                <a:latin typeface="Times New Roman" charset="0"/>
+              </a:rPr>
+              <a:t>inValue</a:t>
+            </a:r>
+            <a:r>
+              <a:rPr lang="en-US" dirty="0" smtClean="0">
+                <a:latin typeface="Times New Roman" charset="0"/>
+              </a:rPr>
+              <a:t> = </a:t>
+            </a:r>
+            <a:r>
+              <a:rPr lang="en-US" dirty="0" err="1" smtClean="0">
+                <a:latin typeface="Times New Roman" charset="0"/>
+              </a:rPr>
+              <a:t>inputFile.ReadLine</a:t>
+            </a:r>
+            <a:r>
+              <a:rPr lang="en-US" dirty="0" smtClean="0">
+                <a:latin typeface="Times New Roman" charset="0"/>
+              </a:rPr>
+              <a:t>( );</a:t>
+            </a:r>
+          </a:p>
+          <a:p>
+            <a:pPr lvl="1">
+              <a:lnSpc>
+                <a:spcPct val="88000"/>
+              </a:lnSpc>
+              <a:spcBef>
+                <a:spcPts val="700"/>
+              </a:spcBef>
+              <a:buNone/>
+            </a:pPr>
+            <a:endParaRPr lang="en-US" dirty="0" smtClean="0">
+              <a:latin typeface="Times New Roman" charset="0"/>
+            </a:endParaRPr>
+          </a:p>
+          <a:p>
+            <a:endParaRPr lang="en-US" dirty="0"/>
+          </a:p>
+        </p:txBody>
+      </p:sp>
+      <p:sp>
+        <p:nvSpPr>
+          <p:cNvPr id="4" name="TextBox 3"/>
+          <p:cNvSpPr txBox="1"/>
+          <p:nvPr/>
+        </p:nvSpPr>
+        <p:spPr>
+          <a:xfrm>
+            <a:off x="-3579252" y="2408342"/>
+            <a:ext cx="184666" cy="369332"/>
+          </a:xfrm>
+          <a:prstGeom prst="rect">
+            <a:avLst/>
+          </a:prstGeom>
+          <a:noFill/>
+        </p:spPr>
+        <p:txBody>
+          <a:bodyPr wrap="none" rtlCol="0">
+            <a:spAutoFit/>
+          </a:bodyPr>
+          <a:lstStyle/>
+          <a:p>
+            <a:endParaRPr lang="en-US" dirty="0"/>
+          </a:p>
+        </p:txBody>
+      </p:sp>
+    </p:spTree>
+    <p:extLst>
+      <p:ext uri="{BB962C8B-B14F-4D97-AF65-F5344CB8AC3E}">
+        <p14:creationId xmlns:p14="http://schemas.microsoft.com/office/powerpoint/2010/main" val="3982861813"/>
+      </p:ext>
+    </p:extLst>
+  </p:cSld>
+  <p:clrMapOvr>
+    <a:masterClrMapping/>
+  </p:clrMapOvr>
+  <p:timing>
+    <p:tnLst>
+      <p:par>
+        <p:cTn xmlns:p14="http://schemas.microsoft.com/office/powerpoint/2010/main" id="1" dur="indefinite" restart="never" nodeType="tmRoot"/>
+      </p:par>
+    </p:tnLst>
+  </p:timing>
+</p:sld>
+</file>
+
+<file path=ppt/slides/slide13.xml><?xml version="1.0" encoding="utf-8"?>
+<p:sld xmlns:a="http://schemas.openxmlformats.org/drawingml/2006/main" xmlns:r="http://schemas.openxmlformats.org/officeDocument/2006/relationships" xmlns:p="http://schemas.openxmlformats.org/presentationml/2006/main">
+  <p:cSld>
+    <p:spTree>
+      <p:nvGrpSpPr>
+        <p:cNvPr id="1" name=""/>
+        <p:cNvGrpSpPr/>
+        <p:nvPr/>
+      </p:nvGrpSpPr>
+      <p:grpSpPr>
+        <a:xfrm>
+          <a:off x="0" y="0"/>
+          <a:ext cx="0" cy="0"/>
+          <a:chOff x="0" y="0"/>
+          <a:chExt cx="0" cy="0"/>
+        </a:xfrm>
+      </p:grpSpPr>
+      <p:sp>
+        <p:nvSpPr>
+          <p:cNvPr id="4" name="Rectangle 3"/>
+          <p:cNvSpPr/>
+          <p:nvPr/>
+        </p:nvSpPr>
+        <p:spPr>
+          <a:xfrm>
+            <a:off x="446257" y="431759"/>
+            <a:ext cx="8822179" cy="3231653"/>
+          </a:xfrm>
+          <a:prstGeom prst="rect">
+            <a:avLst/>
+          </a:prstGeom>
+        </p:spPr>
+        <p:txBody>
+          <a:bodyPr wrap="square">
+            <a:spAutoFit/>
+          </a:bodyPr>
+          <a:lstStyle/>
+          <a:p>
+            <a:r>
+              <a:rPr lang="en-US" sz="1400" b="1" u="sng" dirty="0" smtClean="0"/>
+              <a:t>Stream Writer</a:t>
+            </a:r>
+          </a:p>
+          <a:p>
+            <a:r>
+              <a:rPr lang="en-US" sz="1200" b="1" dirty="0" smtClean="0"/>
+              <a:t>Writing one char</a:t>
+            </a:r>
+          </a:p>
+          <a:p>
+            <a:r>
+              <a:rPr lang="en-US" sz="1200" dirty="0" smtClean="0"/>
+              <a:t>public virtual void Write (char value);</a:t>
+            </a:r>
+          </a:p>
+          <a:p>
+            <a:endParaRPr lang="en-US" sz="1200" dirty="0" smtClean="0"/>
+          </a:p>
+          <a:p>
+            <a:r>
+              <a:rPr lang="en-US" sz="1200" b="1" dirty="0" smtClean="0"/>
+              <a:t>Writing many chars</a:t>
+            </a:r>
+          </a:p>
+          <a:p>
+            <a:r>
+              <a:rPr lang="en-US" sz="1200" dirty="0" smtClean="0"/>
+              <a:t>public virtual void Write (string value);</a:t>
+            </a:r>
+          </a:p>
+          <a:p>
+            <a:r>
+              <a:rPr lang="en-US" sz="1200" dirty="0" smtClean="0"/>
+              <a:t>public virtual void Write (char[] buffer, </a:t>
+            </a:r>
+            <a:r>
+              <a:rPr lang="en-US" sz="1200" dirty="0" err="1" smtClean="0"/>
+              <a:t>int</a:t>
+            </a:r>
+            <a:r>
+              <a:rPr lang="en-US" sz="1200" dirty="0" smtClean="0"/>
+              <a:t> index, </a:t>
+            </a:r>
+            <a:r>
+              <a:rPr lang="en-US" sz="1200" dirty="0" err="1" smtClean="0"/>
+              <a:t>int</a:t>
+            </a:r>
+            <a:r>
+              <a:rPr lang="en-US" sz="1200" dirty="0" smtClean="0"/>
+              <a:t> count);</a:t>
+            </a:r>
+          </a:p>
+          <a:p>
+            <a:r>
+              <a:rPr lang="en-US" sz="1200" dirty="0" smtClean="0"/>
+              <a:t>public virtual void Write (string format, </a:t>
+            </a:r>
+            <a:r>
+              <a:rPr lang="en-US" sz="1200" dirty="0" err="1" smtClean="0"/>
+              <a:t>params</a:t>
+            </a:r>
+            <a:r>
+              <a:rPr lang="en-US" sz="1200" dirty="0" smtClean="0"/>
+              <a:t> object[] </a:t>
+            </a:r>
+            <a:r>
+              <a:rPr lang="en-US" sz="1200" dirty="0" err="1" smtClean="0"/>
+              <a:t>arg</a:t>
+            </a:r>
+            <a:r>
+              <a:rPr lang="en-US" sz="1200" dirty="0" smtClean="0"/>
+              <a:t>);</a:t>
+            </a:r>
+          </a:p>
+          <a:p>
+            <a:r>
+              <a:rPr lang="en-US" sz="1200" dirty="0" smtClean="0"/>
+              <a:t>public virtual void </a:t>
+            </a:r>
+            <a:r>
+              <a:rPr lang="en-US" sz="1200" dirty="0" err="1" smtClean="0"/>
+              <a:t>WriteLine</a:t>
+            </a:r>
+            <a:r>
+              <a:rPr lang="en-US" sz="1200" dirty="0" smtClean="0"/>
+              <a:t> (string value);</a:t>
+            </a:r>
+          </a:p>
+          <a:p>
+            <a:endParaRPr lang="en-US" sz="1200" dirty="0" smtClean="0"/>
+          </a:p>
+          <a:p>
+            <a:r>
+              <a:rPr lang="en-US" sz="1200" b="1" dirty="0" smtClean="0"/>
+              <a:t>Closing and flushing</a:t>
+            </a:r>
+          </a:p>
+          <a:p>
+            <a:r>
+              <a:rPr lang="en-US" sz="1200" dirty="0" smtClean="0"/>
+              <a:t>public virtual void Close();</a:t>
+            </a:r>
+          </a:p>
+          <a:p>
+            <a:r>
+              <a:rPr lang="en-US" sz="1200" dirty="0" smtClean="0"/>
+              <a:t> public void Dispose(); // Same as Close</a:t>
+            </a:r>
+          </a:p>
+          <a:p>
+            <a:r>
+              <a:rPr lang="en-US" sz="1200" dirty="0" smtClean="0"/>
+              <a:t>public virtual void Flush();</a:t>
+            </a:r>
+          </a:p>
+          <a:p>
+            <a:r>
+              <a:rPr lang="en-US" sz="1200" dirty="0" smtClean="0"/>
+              <a:t>	</a:t>
+            </a:r>
+          </a:p>
+          <a:p>
+            <a:r>
+              <a:rPr lang="en-US" sz="1200" dirty="0" smtClean="0"/>
+              <a:t>public abstract Encoding Encoding { get; }</a:t>
+            </a:r>
+          </a:p>
+          <a:p>
+            <a:endParaRPr lang="en-US" sz="1200" dirty="0" smtClean="0"/>
+          </a:p>
+        </p:txBody>
+      </p:sp>
+      <p:sp>
+        <p:nvSpPr>
+          <p:cNvPr id="5" name="Rectangle 4"/>
+          <p:cNvSpPr/>
+          <p:nvPr/>
+        </p:nvSpPr>
+        <p:spPr>
+          <a:xfrm>
+            <a:off x="446257" y="3658457"/>
+            <a:ext cx="8187121" cy="3077765"/>
+          </a:xfrm>
+          <a:prstGeom prst="rect">
+            <a:avLst/>
+          </a:prstGeom>
+        </p:spPr>
+        <p:txBody>
+          <a:bodyPr wrap="square">
+            <a:spAutoFit/>
+          </a:bodyPr>
+          <a:lstStyle/>
+          <a:p>
+            <a:r>
+              <a:rPr lang="en-US" sz="1400" b="1" u="sng" dirty="0" smtClean="0"/>
+              <a:t>Stream Reader</a:t>
+            </a:r>
+          </a:p>
+          <a:p>
+            <a:endParaRPr lang="en-US" sz="1200" b="1" dirty="0" smtClean="0"/>
+          </a:p>
+          <a:p>
+            <a:r>
+              <a:rPr lang="en-US" sz="1200" b="1" dirty="0" smtClean="0"/>
+              <a:t>Reading one char</a:t>
+            </a:r>
+          </a:p>
+          <a:p>
+            <a:r>
+              <a:rPr lang="en-US" sz="1200" dirty="0" smtClean="0"/>
+              <a:t>public virtual </a:t>
+            </a:r>
+            <a:r>
+              <a:rPr lang="en-US" sz="1200" dirty="0" err="1" smtClean="0"/>
+              <a:t>int</a:t>
+            </a:r>
+            <a:r>
+              <a:rPr lang="en-US" sz="1200" dirty="0" smtClean="0"/>
+              <a:t> Peek(); // Cast the result to a char</a:t>
+            </a:r>
+          </a:p>
+          <a:p>
+            <a:r>
+              <a:rPr lang="en-US" sz="1200" dirty="0" smtClean="0"/>
+              <a:t>public virtual </a:t>
+            </a:r>
+            <a:r>
+              <a:rPr lang="en-US" sz="1200" dirty="0" err="1" smtClean="0"/>
+              <a:t>int</a:t>
+            </a:r>
+            <a:r>
+              <a:rPr lang="en-US" sz="1200" dirty="0" smtClean="0"/>
+              <a:t> Read(); // Cast the result to a char</a:t>
+            </a:r>
+          </a:p>
+          <a:p>
+            <a:endParaRPr lang="en-US" sz="1200" dirty="0" smtClean="0"/>
+          </a:p>
+          <a:p>
+            <a:r>
+              <a:rPr lang="en-US" sz="1200" b="1" dirty="0" smtClean="0"/>
+              <a:t>Reading many chars</a:t>
+            </a:r>
+          </a:p>
+          <a:p>
+            <a:r>
+              <a:rPr lang="en-US" sz="1200" dirty="0" smtClean="0"/>
+              <a:t>public virtual </a:t>
+            </a:r>
+            <a:r>
+              <a:rPr lang="en-US" sz="1200" dirty="0" err="1" smtClean="0"/>
+              <a:t>int</a:t>
+            </a:r>
+            <a:r>
+              <a:rPr lang="en-US" sz="1200" dirty="0" smtClean="0"/>
+              <a:t> Read (char[] buffer, </a:t>
+            </a:r>
+            <a:r>
+              <a:rPr lang="en-US" sz="1200" dirty="0" err="1" smtClean="0"/>
+              <a:t>int</a:t>
+            </a:r>
+            <a:r>
+              <a:rPr lang="en-US" sz="1200" dirty="0" smtClean="0"/>
+              <a:t> index, </a:t>
+            </a:r>
+            <a:r>
+              <a:rPr lang="en-US" sz="1200" dirty="0" err="1" smtClean="0"/>
+              <a:t>int</a:t>
+            </a:r>
+            <a:r>
+              <a:rPr lang="en-US" sz="1200" dirty="0" smtClean="0"/>
+              <a:t> count);</a:t>
+            </a:r>
+          </a:p>
+          <a:p>
+            <a:r>
+              <a:rPr lang="en-US" sz="1200" dirty="0" smtClean="0"/>
+              <a:t>public virtual </a:t>
+            </a:r>
+            <a:r>
+              <a:rPr lang="en-US" sz="1200" dirty="0" err="1" smtClean="0"/>
+              <a:t>int</a:t>
+            </a:r>
+            <a:r>
+              <a:rPr lang="en-US" sz="1200" dirty="0" smtClean="0"/>
+              <a:t> </a:t>
+            </a:r>
+            <a:r>
+              <a:rPr lang="en-US" sz="1200" dirty="0" err="1" smtClean="0"/>
+              <a:t>ReadBlock</a:t>
+            </a:r>
+            <a:r>
+              <a:rPr lang="en-US" sz="1200" dirty="0" smtClean="0"/>
+              <a:t> (char[] buffer, </a:t>
+            </a:r>
+            <a:r>
+              <a:rPr lang="en-US" sz="1200" dirty="0" err="1" smtClean="0"/>
+              <a:t>int</a:t>
+            </a:r>
+            <a:r>
+              <a:rPr lang="en-US" sz="1200" dirty="0" smtClean="0"/>
+              <a:t> index, </a:t>
+            </a:r>
+            <a:r>
+              <a:rPr lang="en-US" sz="1200" dirty="0" err="1" smtClean="0"/>
+              <a:t>int</a:t>
+            </a:r>
+            <a:r>
+              <a:rPr lang="en-US" sz="1200" dirty="0" smtClean="0"/>
+              <a:t> count);</a:t>
+            </a:r>
+          </a:p>
+          <a:p>
+            <a:r>
+              <a:rPr lang="en-US" sz="1200" dirty="0" smtClean="0"/>
+              <a:t>public virtual string </a:t>
+            </a:r>
+            <a:r>
+              <a:rPr lang="en-US" sz="1200" dirty="0" err="1" smtClean="0"/>
+              <a:t>ReadLine</a:t>
+            </a:r>
+            <a:r>
+              <a:rPr lang="en-US" sz="1200" dirty="0" smtClean="0"/>
+              <a:t>();</a:t>
+            </a:r>
+          </a:p>
+          <a:p>
+            <a:r>
+              <a:rPr lang="en-US" sz="1200" dirty="0" smtClean="0"/>
+              <a:t>public virtual string </a:t>
+            </a:r>
+            <a:r>
+              <a:rPr lang="en-US" sz="1200" dirty="0" err="1" smtClean="0"/>
+              <a:t>ReadToEnd</a:t>
+            </a:r>
+            <a:r>
+              <a:rPr lang="en-US" sz="1200" dirty="0" smtClean="0"/>
+              <a:t>();</a:t>
+            </a:r>
+          </a:p>
+          <a:p>
+            <a:endParaRPr lang="en-US" sz="1200" dirty="0" smtClean="0"/>
+          </a:p>
+          <a:p>
+            <a:r>
+              <a:rPr lang="en-US" sz="1200" b="1" dirty="0" smtClean="0"/>
+              <a:t>Closing</a:t>
+            </a:r>
+          </a:p>
+          <a:p>
+            <a:r>
+              <a:rPr lang="en-US" sz="1200" dirty="0" smtClean="0"/>
+              <a:t>public virtual void Close();</a:t>
+            </a:r>
+          </a:p>
+          <a:p>
+            <a:r>
+              <a:rPr lang="en-US" sz="1200" dirty="0" smtClean="0"/>
+              <a:t> 	</a:t>
+            </a:r>
+          </a:p>
+          <a:p>
+            <a:r>
+              <a:rPr lang="en-US" sz="1200" dirty="0" smtClean="0"/>
+              <a:t>public void Dispose(); // Same as Close</a:t>
+            </a:r>
+            <a:endParaRPr lang="en-US" sz="1200" dirty="0"/>
+          </a:p>
+        </p:txBody>
+      </p:sp>
+    </p:spTree>
+    <p:extLst>
+      <p:ext uri="{BB962C8B-B14F-4D97-AF65-F5344CB8AC3E}">
+        <p14:creationId xmlns:p14="http://schemas.microsoft.com/office/powerpoint/2010/main" val="1781519109"/>
+      </p:ext>
+    </p:extLst>
+  </p:cSld>
+  <p:clrMapOvr>
+    <a:masterClrMapping/>
+  </p:clrMapOvr>
+  <p:timing>
+    <p:tnLst>
+      <p:par>
+        <p:cTn xmlns:p14="http://schemas.microsoft.com/office/powerpoint/2010/main" id="1" dur="indefinite" restart="never" nodeType="tmRoot"/>
+      </p:par>
+    </p:tnLst>
+  </p:timing>
+</p:sld>
+</file>
+
+<file path=ppt/slides/slide14.xml><?xml version="1.0" encoding="utf-8"?>
+<p:sld xmlns:a="http://schemas.openxmlformats.org/drawingml/2006/main" xmlns:r="http://schemas.openxmlformats.org/officeDocument/2006/relationships" xmlns:p="http://schemas.openxmlformats.org/presentationml/2006/main">
+  <p:cSld>
+    <p:spTree>
+      <p:nvGrpSpPr>
+        <p:cNvPr id="1" name=""/>
+        <p:cNvGrpSpPr/>
+        <p:nvPr/>
+      </p:nvGrpSpPr>
+      <p:grpSpPr>
+        <a:xfrm>
+          <a:off x="0" y="0"/>
+          <a:ext cx="0" cy="0"/>
+          <a:chOff x="0" y="0"/>
+          <a:chExt cx="0" cy="0"/>
+        </a:xfrm>
+      </p:grpSpPr>
+      <p:sp>
+        <p:nvSpPr>
+          <p:cNvPr id="2" name="Title 1"/>
+          <p:cNvSpPr>
+            <a:spLocks noGrp="1"/>
+          </p:cNvSpPr>
+          <p:nvPr>
+            <p:ph type="title"/>
+          </p:nvPr>
+        </p:nvSpPr>
+        <p:spPr/>
+        <p:txBody>
+          <a:bodyPr/>
+          <a:lstStyle/>
+          <a:p>
+            <a:r>
+              <a:rPr lang="en-US" dirty="0" smtClean="0"/>
+              <a:t>Exceptions</a:t>
+            </a:r>
+            <a:endParaRPr lang="en-US" dirty="0"/>
+          </a:p>
+        </p:txBody>
+      </p:sp>
+      <p:sp>
+        <p:nvSpPr>
+          <p:cNvPr id="3" name="Content Placeholder 2"/>
+          <p:cNvSpPr>
+            <a:spLocks noGrp="1"/>
+          </p:cNvSpPr>
+          <p:nvPr>
+            <p:ph idx="1"/>
+          </p:nvPr>
+        </p:nvSpPr>
+        <p:spPr/>
+        <p:txBody>
+          <a:bodyPr/>
+          <a:lstStyle/>
+          <a:p>
+            <a:pPr marL="342900" lvl="1" indent="-342900">
+              <a:buFont typeface="Arial"/>
+              <a:buChar char="•"/>
+            </a:pPr>
+            <a:r>
+              <a:rPr lang="en-US" dirty="0" smtClean="0">
+                <a:latin typeface="Times New Roman" charset="0"/>
+              </a:rPr>
+              <a:t>FileNotFoundException</a:t>
+            </a:r>
+            <a:endParaRPr lang="en-US" dirty="0">
+              <a:latin typeface="Times New Roman" charset="0"/>
+            </a:endParaRPr>
+          </a:p>
+          <a:p>
+            <a:pPr marL="342900" lvl="1" indent="-342900">
+              <a:buFont typeface="Arial"/>
+              <a:buChar char="•"/>
+            </a:pPr>
+            <a:r>
+              <a:rPr lang="en-US" dirty="0" smtClean="0">
+                <a:latin typeface="Times New Roman" charset="0"/>
+              </a:rPr>
+              <a:t>DirectoryNotFoundException</a:t>
+            </a:r>
+            <a:endParaRPr lang="en-US" dirty="0">
+              <a:latin typeface="Times New Roman" charset="0"/>
+            </a:endParaRPr>
+          </a:p>
+          <a:p>
+            <a:pPr marL="342900" lvl="1" indent="-342900">
+              <a:buFont typeface="Arial"/>
+              <a:buChar char="•"/>
+            </a:pPr>
+            <a:r>
+              <a:rPr lang="en-US" dirty="0" smtClean="0">
+                <a:latin typeface="Times New Roman" charset="0"/>
+              </a:rPr>
+              <a:t>App Crashes</a:t>
+            </a:r>
+          </a:p>
+          <a:p>
+            <a:pPr marL="742950" lvl="2" indent="-342900"/>
+            <a:r>
+              <a:rPr lang="en-US" dirty="0" smtClean="0">
+                <a:latin typeface="Times New Roman" charset="0"/>
+              </a:rPr>
+              <a:t>Dispose/Close the streams</a:t>
+            </a:r>
+            <a:endParaRPr lang="en-US" dirty="0"/>
+          </a:p>
+        </p:txBody>
+      </p:sp>
+    </p:spTree>
+    <p:extLst>
+      <p:ext uri="{BB962C8B-B14F-4D97-AF65-F5344CB8AC3E}">
+        <p14:creationId xmlns:p14="http://schemas.microsoft.com/office/powerpoint/2010/main" val="3269607516"/>
+      </p:ext>
+    </p:extLst>
+  </p:cSld>
+  <p:clrMapOvr>
+    <a:masterClrMapping/>
+  </p:clrMapOvr>
+  <p:timing>
+    <p:tnLst>
+      <p:par>
+        <p:cTn xmlns:p14="http://schemas.microsoft.com/office/powerpoint/2010/main" id="1" dur="indefinite" restart="never" nodeType="tmRoot"/>
+      </p:par>
+    </p:tnLst>
+  </p:timing>
+</p:sld>
+</file>
+
+<file path=ppt/slides/slide15.xml><?xml version="1.0" encoding="utf-8"?>
+<p:sld xmlns:a="http://schemas.openxmlformats.org/drawingml/2006/main" xmlns:r="http://schemas.openxmlformats.org/officeDocument/2006/relationships" xmlns:p="http://schemas.openxmlformats.org/presentationml/2006/main">
+  <p:cSld>
+    <p:spTree>
+      <p:nvGrpSpPr>
+        <p:cNvPr id="1" name=""/>
+        <p:cNvGrpSpPr/>
+        <p:nvPr/>
+      </p:nvGrpSpPr>
+      <p:grpSpPr>
+        <a:xfrm>
+          <a:off x="0" y="0"/>
+          <a:ext cx="0" cy="0"/>
+          <a:chOff x="0" y="0"/>
+          <a:chExt cx="0" cy="0"/>
+        </a:xfrm>
+      </p:grpSpPr>
+      <p:sp>
+        <p:nvSpPr>
+          <p:cNvPr id="2" name="Title 1"/>
+          <p:cNvSpPr>
+            <a:spLocks noGrp="1"/>
+          </p:cNvSpPr>
+          <p:nvPr>
+            <p:ph type="title"/>
+          </p:nvPr>
+        </p:nvSpPr>
+        <p:spPr/>
+        <p:txBody>
+          <a:bodyPr/>
+          <a:lstStyle/>
+          <a:p>
+            <a:r>
+              <a:rPr lang="en-US" dirty="0" smtClean="0">
+                <a:latin typeface="Times New Roman" charset="0"/>
+              </a:rPr>
               <a:t>Adding a Using Statement</a:t>
             </a:r>
             <a:endParaRPr lang="en-US" dirty="0"/>
@@ -4007,7 +4848,7 @@
 </p:sld>
 </file>
 
-<file path=ppt/slides/slide13.xml><?xml version="1.0" encoding="utf-8"?>
+<file path=ppt/slides/slide16.xml><?xml version="1.0" encoding="utf-8"?>
 <p:sld xmlns:a="http://schemas.openxmlformats.org/drawingml/2006/main" xmlns:r="http://schemas.openxmlformats.org/officeDocument/2006/relationships" xmlns:p="http://schemas.openxmlformats.org/presentationml/2006/main">
   <p:cSld>
     <p:spTree>
@@ -4680,7 +5521,7 @@
 </p:sld>
 </file>
 
-<file path=ppt/slides/slide14.xml><?xml version="1.0" encoding="utf-8"?>
+<file path=ppt/slides/slide17.xml><?xml version="1.0" encoding="utf-8"?>
 <p:sld xmlns:a="http://schemas.openxmlformats.org/drawingml/2006/main" xmlns:r="http://schemas.openxmlformats.org/officeDocument/2006/relationships" xmlns:p="http://schemas.openxmlformats.org/presentationml/2006/main">
   <p:cSld>
     <p:spTree>
@@ -4795,7 +5636,7 @@
 </p:sld>
 </file>
 
-<file path=ppt/slides/slide15.xml><?xml version="1.0" encoding="utf-8"?>
+<file path=ppt/slides/slide18.xml><?xml version="1.0" encoding="utf-8"?>
 <p:sld xmlns:a="http://schemas.openxmlformats.org/drawingml/2006/main" xmlns:r="http://schemas.openxmlformats.org/officeDocument/2006/relationships" xmlns:p="http://schemas.openxmlformats.org/presentationml/2006/main">
   <p:cSld>
     <p:spTree>
@@ -4990,7 +5831,7 @@
 </p:sld>
 </file>
 
-<file path=ppt/slides/slide16.xml><?xml version="1.0" encoding="utf-8"?>
+<file path=ppt/slides/slide19.xml><?xml version="1.0" encoding="utf-8"?>
 <p:sld xmlns:a="http://schemas.openxmlformats.org/drawingml/2006/main" xmlns:r="http://schemas.openxmlformats.org/officeDocument/2006/relationships" xmlns:p="http://schemas.openxmlformats.org/presentationml/2006/main">
   <p:cSld>
     <p:spTree>
@@ -5953,101 +6794,431 @@
       </p:grpSpPr>
       <p:sp>
         <p:nvSpPr>
-          <p:cNvPr id="2" name="Title 1"/>
-          <p:cNvSpPr>
-            <a:spLocks noGrp="1"/>
-          </p:cNvSpPr>
-          <p:nvPr>
-            <p:ph type="title"/>
-          </p:nvPr>
-        </p:nvSpPr>
-        <p:spPr/>
-        <p:txBody>
-          <a:bodyPr/>
+          <p:cNvPr id="4" name="Rectangle 3"/>
+          <p:cNvSpPr/>
+          <p:nvPr/>
+        </p:nvSpPr>
+        <p:spPr>
+          <a:xfrm>
+            <a:off x="800476" y="349587"/>
+            <a:ext cx="8056032" cy="6247866"/>
+          </a:xfrm>
+          <a:prstGeom prst="rect">
+            <a:avLst/>
+          </a:prstGeom>
+        </p:spPr>
+        <p:txBody>
+          <a:bodyPr wrap="square">
+            <a:spAutoFit/>
+          </a:bodyPr>
           <a:lstStyle/>
           <a:p>
             <a:r>
-              <a:rPr lang="en-US" dirty="0" smtClean="0">
-                <a:latin typeface="Times New Roman" charset="0"/>
-              </a:rPr>
-              <a:t>Directory Class</a:t>
-            </a:r>
-            <a:endParaRPr lang="en-US" dirty="0"/>
-          </a:p>
-        </p:txBody>
-      </p:sp>
-      <p:sp>
-        <p:nvSpPr>
-          <p:cNvPr id="3" name="Content Placeholder 2"/>
-          <p:cNvSpPr>
-            <a:spLocks noGrp="1"/>
-          </p:cNvSpPr>
-          <p:nvPr>
-            <p:ph idx="1"/>
-          </p:nvPr>
-        </p:nvSpPr>
-        <p:spPr/>
-        <p:txBody>
-          <a:bodyPr/>
-          <a:lstStyle/>
-          <a:p>
-            <a:r>
-              <a:rPr lang="en-US" dirty="0" smtClean="0">
-                <a:latin typeface="Times New Roman" charset="0"/>
-              </a:rPr>
-              <a:t>Static methods for creating and moving through directories and subdirectories </a:t>
-            </a:r>
-          </a:p>
-          <a:p>
-            <a:endParaRPr lang="en-US" dirty="0" smtClean="0"/>
-          </a:p>
-          <a:p>
-            <a:pPr lvl="1">
-              <a:buFont typeface="Wingdings" charset="2"/>
-              <a:buChar char="ü"/>
-            </a:pPr>
-            <a:r>
-              <a:rPr lang="en-US" sz="2000" dirty="0" smtClean="0"/>
-              <a:t>Create</a:t>
-            </a:r>
-          </a:p>
-          <a:p>
-            <a:pPr lvl="1">
-              <a:buFont typeface="Wingdings" charset="2"/>
-              <a:buChar char="ü"/>
-            </a:pPr>
-            <a:r>
-              <a:rPr lang="en-US" sz="2000" dirty="0" smtClean="0"/>
-              <a:t>Delete</a:t>
-            </a:r>
-          </a:p>
-          <a:p>
-            <a:pPr lvl="1">
-              <a:buFont typeface="Wingdings" charset="2"/>
-              <a:buChar char="ü"/>
-            </a:pPr>
-            <a:r>
-              <a:rPr lang="en-US" sz="2000" dirty="0" smtClean="0"/>
-              <a:t>Exists</a:t>
-            </a:r>
-          </a:p>
-          <a:p>
-            <a:pPr lvl="1">
-              <a:buFont typeface="Wingdings" charset="2"/>
-              <a:buChar char="ü"/>
-            </a:pPr>
-            <a:r>
-              <a:rPr lang="en-US" sz="2000" dirty="0" err="1" smtClean="0"/>
-              <a:t>EnumerateDirectories</a:t>
-            </a:r>
-            <a:endParaRPr lang="en-US" sz="2000" dirty="0"/>
+              <a:rPr lang="en-US" sz="1600" dirty="0" err="1" smtClean="0"/>
+              <a:t>bool</a:t>
+            </a:r>
+            <a:r>
+              <a:rPr lang="en-US" sz="1600" dirty="0" smtClean="0"/>
+              <a:t> Exists (string path);      // Returns true if the file is present</a:t>
+            </a:r>
+          </a:p>
+          <a:p>
+            <a:endParaRPr lang="en-US" sz="1600" dirty="0" smtClean="0"/>
+          </a:p>
+          <a:p>
+            <a:r>
+              <a:rPr lang="en-US" sz="1600" dirty="0" smtClean="0"/>
+              <a:t>void Delete  (string path);</a:t>
+            </a:r>
+          </a:p>
+          <a:p>
+            <a:r>
+              <a:rPr lang="en-US" sz="1600" dirty="0" smtClean="0"/>
+              <a:t>void Copy    (string </a:t>
+            </a:r>
+            <a:r>
+              <a:rPr lang="en-US" sz="1600" dirty="0" err="1" smtClean="0"/>
+              <a:t>sourceFileName</a:t>
+            </a:r>
+            <a:r>
+              <a:rPr lang="en-US" sz="1600" dirty="0" smtClean="0"/>
+              <a:t>, string </a:t>
+            </a:r>
+            <a:r>
+              <a:rPr lang="en-US" sz="1600" dirty="0" err="1" smtClean="0"/>
+              <a:t>destFileName</a:t>
+            </a:r>
+            <a:r>
+              <a:rPr lang="en-US" sz="1600" dirty="0" smtClean="0"/>
+              <a:t>);</a:t>
+            </a:r>
+          </a:p>
+          <a:p>
+            <a:r>
+              <a:rPr lang="en-US" sz="1600" dirty="0" smtClean="0"/>
+              <a:t>void Move    (string </a:t>
+            </a:r>
+            <a:r>
+              <a:rPr lang="en-US" sz="1600" dirty="0" err="1" smtClean="0"/>
+              <a:t>sourceFileName</a:t>
+            </a:r>
+            <a:r>
+              <a:rPr lang="en-US" sz="1600" dirty="0" smtClean="0"/>
+              <a:t>, string </a:t>
+            </a:r>
+            <a:r>
+              <a:rPr lang="en-US" sz="1600" dirty="0" err="1" smtClean="0"/>
+              <a:t>destFileName</a:t>
+            </a:r>
+            <a:r>
+              <a:rPr lang="en-US" sz="1600" dirty="0" smtClean="0"/>
+              <a:t>);</a:t>
+            </a:r>
+          </a:p>
+          <a:p>
+            <a:r>
+              <a:rPr lang="en-US" sz="1600" dirty="0" smtClean="0"/>
+              <a:t>void Replace (string </a:t>
+            </a:r>
+            <a:r>
+              <a:rPr lang="en-US" sz="1600" dirty="0" err="1" smtClean="0"/>
+              <a:t>sourceFileName</a:t>
+            </a:r>
+            <a:r>
+              <a:rPr lang="en-US" sz="1600" dirty="0" smtClean="0"/>
+              <a:t>, string </a:t>
+            </a:r>
+            <a:r>
+              <a:rPr lang="en-US" sz="1600" dirty="0" err="1" smtClean="0"/>
+              <a:t>destinationFileName</a:t>
+            </a:r>
+            <a:r>
+              <a:rPr lang="en-US" sz="1600" dirty="0" smtClean="0"/>
+              <a:t>,</a:t>
+            </a:r>
+          </a:p>
+          <a:p>
+            <a:r>
+              <a:rPr lang="en-US" sz="1600" dirty="0" smtClean="0"/>
+              <a:t>                                     string </a:t>
+            </a:r>
+            <a:r>
+              <a:rPr lang="en-US" sz="1600" dirty="0" err="1" smtClean="0"/>
+              <a:t>destinationBackupFileName</a:t>
+            </a:r>
+            <a:r>
+              <a:rPr lang="en-US" sz="1600" dirty="0" smtClean="0"/>
+              <a:t>);</a:t>
+            </a:r>
+          </a:p>
+          <a:p>
+            <a:endParaRPr lang="en-US" sz="1600" dirty="0" smtClean="0"/>
+          </a:p>
+          <a:p>
+            <a:r>
+              <a:rPr lang="en-US" sz="1600" dirty="0" err="1" smtClean="0"/>
+              <a:t>FileAttributes</a:t>
+            </a:r>
+            <a:r>
+              <a:rPr lang="en-US" sz="1600" dirty="0" smtClean="0"/>
+              <a:t> </a:t>
+            </a:r>
+            <a:r>
+              <a:rPr lang="en-US" sz="1600" dirty="0" err="1" smtClean="0"/>
+              <a:t>GetAttributes</a:t>
+            </a:r>
+            <a:r>
+              <a:rPr lang="en-US" sz="1600" dirty="0" smtClean="0"/>
+              <a:t> (string path);</a:t>
+            </a:r>
+          </a:p>
+          <a:p>
+            <a:r>
+              <a:rPr lang="en-US" sz="1600" dirty="0" smtClean="0"/>
+              <a:t>void </a:t>
+            </a:r>
+            <a:r>
+              <a:rPr lang="en-US" sz="1600" dirty="0" err="1" smtClean="0"/>
+              <a:t>SetAttributes</a:t>
+            </a:r>
+            <a:r>
+              <a:rPr lang="en-US" sz="1600" dirty="0" smtClean="0"/>
+              <a:t>  (string path, </a:t>
+            </a:r>
+            <a:r>
+              <a:rPr lang="en-US" sz="1600" dirty="0" err="1" smtClean="0"/>
+              <a:t>FileAttributes</a:t>
+            </a:r>
+            <a:r>
+              <a:rPr lang="en-US" sz="1600" dirty="0" smtClean="0"/>
+              <a:t> </a:t>
+            </a:r>
+            <a:r>
+              <a:rPr lang="en-US" sz="1600" dirty="0" err="1" smtClean="0"/>
+              <a:t>fileAttributes</a:t>
+            </a:r>
+            <a:r>
+              <a:rPr lang="en-US" sz="1600" dirty="0" smtClean="0"/>
+              <a:t>);</a:t>
+            </a:r>
+          </a:p>
+          <a:p>
+            <a:endParaRPr lang="en-US" sz="1600" dirty="0" smtClean="0"/>
+          </a:p>
+          <a:p>
+            <a:r>
+              <a:rPr lang="en-US" sz="1600" dirty="0" smtClean="0"/>
+              <a:t>void Decrypt (string path);</a:t>
+            </a:r>
+          </a:p>
+          <a:p>
+            <a:r>
+              <a:rPr lang="en-US" sz="1600" dirty="0" smtClean="0"/>
+              <a:t>void Encrypt (string path);</a:t>
+            </a:r>
+          </a:p>
+          <a:p>
+            <a:endParaRPr lang="en-US" sz="1600" dirty="0" smtClean="0"/>
+          </a:p>
+          <a:p>
+            <a:r>
+              <a:rPr lang="en-US" sz="1600" dirty="0" err="1" smtClean="0"/>
+              <a:t>DateTime</a:t>
+            </a:r>
+            <a:r>
+              <a:rPr lang="en-US" sz="1600" dirty="0" smtClean="0"/>
+              <a:t> </a:t>
+            </a:r>
+            <a:r>
+              <a:rPr lang="en-US" sz="1600" dirty="0" err="1" smtClean="0"/>
+              <a:t>GetCreationTime</a:t>
+            </a:r>
+            <a:r>
+              <a:rPr lang="en-US" sz="1600" dirty="0" smtClean="0"/>
+              <a:t>   (string path);      // UTC versions are</a:t>
+            </a:r>
+          </a:p>
+          <a:p>
+            <a:r>
+              <a:rPr lang="en-US" sz="1600" dirty="0" err="1" smtClean="0"/>
+              <a:t>DateTime</a:t>
+            </a:r>
+            <a:r>
+              <a:rPr lang="en-US" sz="1600" dirty="0" smtClean="0"/>
+              <a:t> </a:t>
+            </a:r>
+            <a:r>
+              <a:rPr lang="en-US" sz="1600" dirty="0" err="1" smtClean="0"/>
+              <a:t>GetLastAccessTime</a:t>
+            </a:r>
+            <a:r>
+              <a:rPr lang="en-US" sz="1600" dirty="0" smtClean="0"/>
+              <a:t> (string path);      // also provided.</a:t>
+            </a:r>
+          </a:p>
+          <a:p>
+            <a:r>
+              <a:rPr lang="en-US" sz="1600" dirty="0" err="1" smtClean="0"/>
+              <a:t>DateTime</a:t>
+            </a:r>
+            <a:r>
+              <a:rPr lang="en-US" sz="1600" dirty="0" smtClean="0"/>
+              <a:t> </a:t>
+            </a:r>
+            <a:r>
+              <a:rPr lang="en-US" sz="1600" dirty="0" err="1" smtClean="0"/>
+              <a:t>GetLastWriteTime</a:t>
+            </a:r>
+            <a:r>
+              <a:rPr lang="en-US" sz="1600" dirty="0" smtClean="0"/>
+              <a:t>  (string path);</a:t>
+            </a:r>
+          </a:p>
+          <a:p>
+            <a:endParaRPr lang="en-US" sz="1600" dirty="0" smtClean="0"/>
+          </a:p>
+          <a:p>
+            <a:r>
+              <a:rPr lang="en-US" sz="1600" dirty="0" smtClean="0"/>
+              <a:t>void </a:t>
+            </a:r>
+            <a:r>
+              <a:rPr lang="en-US" sz="1600" dirty="0" err="1" smtClean="0"/>
+              <a:t>SetCreationTime</a:t>
+            </a:r>
+            <a:r>
+              <a:rPr lang="en-US" sz="1600" dirty="0" smtClean="0"/>
+              <a:t>   (string path, </a:t>
+            </a:r>
+            <a:r>
+              <a:rPr lang="en-US" sz="1600" dirty="0" err="1" smtClean="0"/>
+              <a:t>DateTime</a:t>
+            </a:r>
+            <a:r>
+              <a:rPr lang="en-US" sz="1600" dirty="0" smtClean="0"/>
+              <a:t> </a:t>
+            </a:r>
+            <a:r>
+              <a:rPr lang="en-US" sz="1600" dirty="0" err="1" smtClean="0"/>
+              <a:t>creationTime</a:t>
+            </a:r>
+            <a:r>
+              <a:rPr lang="en-US" sz="1600" dirty="0" smtClean="0"/>
+              <a:t>);</a:t>
+            </a:r>
+          </a:p>
+          <a:p>
+            <a:r>
+              <a:rPr lang="en-US" sz="1600" dirty="0" smtClean="0"/>
+              <a:t>void </a:t>
+            </a:r>
+            <a:r>
+              <a:rPr lang="en-US" sz="1600" dirty="0" err="1" smtClean="0"/>
+              <a:t>SetLastAccessTime</a:t>
+            </a:r>
+            <a:r>
+              <a:rPr lang="en-US" sz="1600" dirty="0" smtClean="0"/>
+              <a:t> (string path, </a:t>
+            </a:r>
+            <a:r>
+              <a:rPr lang="en-US" sz="1600" dirty="0" err="1" smtClean="0"/>
+              <a:t>DateTime</a:t>
+            </a:r>
+            <a:r>
+              <a:rPr lang="en-US" sz="1600" dirty="0" smtClean="0"/>
+              <a:t> </a:t>
+            </a:r>
+            <a:r>
+              <a:rPr lang="en-US" sz="1600" dirty="0" err="1" smtClean="0"/>
+              <a:t>lastAccessTime</a:t>
+            </a:r>
+            <a:r>
+              <a:rPr lang="en-US" sz="1600" dirty="0" smtClean="0"/>
+              <a:t>);</a:t>
+            </a:r>
+          </a:p>
+          <a:p>
+            <a:r>
+              <a:rPr lang="en-US" sz="1600" dirty="0" smtClean="0"/>
+              <a:t>void </a:t>
+            </a:r>
+            <a:r>
+              <a:rPr lang="en-US" sz="1600" dirty="0" err="1" smtClean="0"/>
+              <a:t>SetLastWriteTime</a:t>
+            </a:r>
+            <a:r>
+              <a:rPr lang="en-US" sz="1600" dirty="0" smtClean="0"/>
+              <a:t>  (string path, </a:t>
+            </a:r>
+            <a:r>
+              <a:rPr lang="en-US" sz="1600" dirty="0" err="1" smtClean="0"/>
+              <a:t>DateTime</a:t>
+            </a:r>
+            <a:r>
+              <a:rPr lang="en-US" sz="1600" dirty="0" smtClean="0"/>
+              <a:t> </a:t>
+            </a:r>
+            <a:r>
+              <a:rPr lang="en-US" sz="1600" dirty="0" err="1" smtClean="0"/>
+              <a:t>lastWriteTime</a:t>
+            </a:r>
+            <a:r>
+              <a:rPr lang="en-US" sz="1600" dirty="0" smtClean="0"/>
+              <a:t>);</a:t>
+            </a:r>
+          </a:p>
+          <a:p>
+            <a:endParaRPr lang="en-US" sz="1600" dirty="0" smtClean="0"/>
+          </a:p>
+          <a:p>
+            <a:r>
+              <a:rPr lang="en-US" sz="1600" dirty="0" err="1" smtClean="0"/>
+              <a:t>FileSecurity</a:t>
+            </a:r>
+            <a:r>
+              <a:rPr lang="en-US" sz="1600" dirty="0" smtClean="0"/>
+              <a:t> </a:t>
+            </a:r>
+            <a:r>
+              <a:rPr lang="en-US" sz="1600" dirty="0" err="1" smtClean="0"/>
+              <a:t>GetAccessControl</a:t>
+            </a:r>
+            <a:r>
+              <a:rPr lang="en-US" sz="1600" dirty="0" smtClean="0"/>
+              <a:t> (string path);</a:t>
+            </a:r>
+          </a:p>
+          <a:p>
+            <a:r>
+              <a:rPr lang="en-US" sz="1600" dirty="0" err="1" smtClean="0"/>
+              <a:t>FileSecurity</a:t>
+            </a:r>
+            <a:r>
+              <a:rPr lang="en-US" sz="1600" dirty="0" smtClean="0"/>
+              <a:t> </a:t>
+            </a:r>
+            <a:r>
+              <a:rPr lang="en-US" sz="1600" dirty="0" err="1" smtClean="0"/>
+              <a:t>GetAccessControl</a:t>
+            </a:r>
+            <a:r>
+              <a:rPr lang="en-US" sz="1600" dirty="0" smtClean="0"/>
+              <a:t> (string path, </a:t>
+            </a:r>
+            <a:r>
+              <a:rPr lang="en-US" sz="1600" dirty="0" err="1" smtClean="0"/>
+              <a:t>AccessControlSections</a:t>
+            </a:r>
+            <a:r>
+              <a:rPr lang="en-US" sz="1600" dirty="0" smtClean="0"/>
+              <a:t> </a:t>
+            </a:r>
+            <a:r>
+              <a:rPr lang="en-US" sz="1600" dirty="0" err="1" smtClean="0"/>
+              <a:t>includeSections</a:t>
+            </a:r>
+            <a:r>
+              <a:rPr lang="en-US" sz="1600" dirty="0" smtClean="0"/>
+              <a:t>);</a:t>
+            </a:r>
+          </a:p>
+          <a:p>
+            <a:r>
+              <a:rPr lang="en-US" sz="1600" dirty="0" smtClean="0"/>
+              <a:t>void </a:t>
+            </a:r>
+            <a:r>
+              <a:rPr lang="en-US" sz="1600" dirty="0" err="1" smtClean="0"/>
+              <a:t>SetAccessControl</a:t>
+            </a:r>
+            <a:r>
+              <a:rPr lang="en-US" sz="1600" dirty="0" smtClean="0"/>
+              <a:t> (string path, </a:t>
+            </a:r>
+            <a:r>
+              <a:rPr lang="en-US" sz="1600" dirty="0" err="1" smtClean="0"/>
+              <a:t>FileSecurity</a:t>
+            </a:r>
+            <a:r>
+              <a:rPr lang="en-US" sz="1600" dirty="0" smtClean="0"/>
+              <a:t> </a:t>
+            </a:r>
+            <a:r>
+              <a:rPr lang="en-US" sz="1600" dirty="0" err="1" smtClean="0"/>
+              <a:t>fileSecurity</a:t>
+            </a:r>
+            <a:r>
+              <a:rPr lang="en-US" sz="1600" dirty="0" smtClean="0"/>
+              <a:t>);</a:t>
+            </a:r>
+            <a:endParaRPr lang="en-US" sz="1600" dirty="0"/>
           </a:p>
         </p:txBody>
       </p:sp>
     </p:spTree>
     <p:extLst>
       <p:ext uri="{BB962C8B-B14F-4D97-AF65-F5344CB8AC3E}">
-        <p14:creationId xmlns:p14="http://schemas.microsoft.com/office/powerpoint/2010/main" val="742885836"/>
+        <p14:creationId xmlns:p14="http://schemas.microsoft.com/office/powerpoint/2010/main" val="3670682323"/>
       </p:ext>
     </p:extLst>
   </p:cSld>
@@ -6100,7 +7271,7 @@
               <a:rPr lang="en-US" dirty="0" smtClean="0">
                 <a:latin typeface="Times New Roman" charset="0"/>
               </a:rPr>
-              <a:t>DirectoryInfo and FileInfo Classes</a:t>
+              <a:t>Directory Class</a:t>
             </a:r>
             <a:endParaRPr lang="en-US" dirty="0"/>
           </a:p>
@@ -6125,79 +7296,59 @@
               <a:rPr lang="en-US" dirty="0" smtClean="0">
                 <a:latin typeface="Times New Roman" charset="0"/>
               </a:rPr>
-              <a:t>File/Directory </a:t>
-            </a:r>
-            <a:r>
-              <a:rPr lang="en-US" dirty="0">
-                <a:latin typeface="Times New Roman" charset="0"/>
-              </a:rPr>
-              <a:t>-</a:t>
-            </a:r>
-            <a:r>
-              <a:rPr lang="en-US" dirty="0" smtClean="0">
-                <a:latin typeface="Times New Roman" charset="0"/>
-              </a:rPr>
-              <a:t> Static class</a:t>
-            </a:r>
-          </a:p>
-          <a:p>
-            <a:r>
-              <a:rPr lang="en-US" dirty="0" smtClean="0">
-                <a:latin typeface="Times New Roman" charset="0"/>
-              </a:rPr>
-              <a:t>FileInfo/DirectoryInfo - Instance </a:t>
-            </a:r>
-            <a:endParaRPr lang="en-US" dirty="0" smtClean="0">
-              <a:latin typeface="Times New Roman" charset="0"/>
-            </a:endParaRPr>
-          </a:p>
-          <a:p>
-            <a:r>
-              <a:rPr lang="en-US" dirty="0" smtClean="0">
-                <a:latin typeface="Times New Roman" charset="0"/>
-              </a:rPr>
-              <a:t>Use File while performing single operations</a:t>
-            </a:r>
-          </a:p>
-          <a:p>
-            <a:r>
-              <a:rPr lang="en-US" dirty="0" smtClean="0">
-                <a:latin typeface="Times New Roman" charset="0"/>
-              </a:rPr>
-              <a:t>Use FileInfo – Multiple operations</a:t>
-            </a:r>
-          </a:p>
-          <a:p>
-            <a:pPr marL="457200" lvl="1" indent="0">
-              <a:buNone/>
+              <a:t>Static methods for creating and moving through directories and subdirectories </a:t>
+            </a:r>
+          </a:p>
+          <a:p>
+            <a:endParaRPr lang="en-US" dirty="0" smtClean="0"/>
+          </a:p>
+          <a:p>
+            <a:pPr lvl="1">
+              <a:buFont typeface="Wingdings" charset="2"/>
+              <a:buChar char="ü"/>
             </a:pPr>
-            <a:endParaRPr lang="en-US" dirty="0" smtClean="0">
-              <a:latin typeface="Times New Roman" charset="0"/>
-            </a:endParaRPr>
-          </a:p>
-          <a:p>
-            <a:pPr marL="457200" lvl="1" indent="0">
-              <a:buNone/>
+            <a:r>
+              <a:rPr lang="en-US" sz="2000" dirty="0" smtClean="0"/>
+              <a:t>Create</a:t>
+            </a:r>
+          </a:p>
+          <a:p>
+            <a:pPr lvl="1">
+              <a:buFont typeface="Wingdings" charset="2"/>
+              <a:buChar char="ü"/>
             </a:pPr>
             <a:r>
-              <a:rPr lang="en-US" dirty="0" smtClean="0">
-                <a:latin typeface="Times New Roman" charset="0"/>
-              </a:rPr>
-              <a:t>Reason: Security checking done while accessing the file</a:t>
-            </a:r>
-            <a:endParaRPr lang="en-US" dirty="0" smtClean="0">
-              <a:latin typeface="Times New Roman" charset="0"/>
-            </a:endParaRPr>
-          </a:p>
-          <a:p>
-            <a:endParaRPr lang="en-US" dirty="0"/>
+              <a:rPr lang="en-US" sz="2000" dirty="0" smtClean="0"/>
+              <a:t>Delete</a:t>
+            </a:r>
+          </a:p>
+          <a:p>
+            <a:pPr lvl="1">
+              <a:buFont typeface="Wingdings" charset="2"/>
+              <a:buChar char="ü"/>
+            </a:pPr>
+            <a:r>
+              <a:rPr lang="en-US" sz="2000" dirty="0" smtClean="0"/>
+              <a:t>Exists</a:t>
+            </a:r>
+          </a:p>
+          <a:p>
+            <a:pPr lvl="1">
+              <a:buFont typeface="Wingdings" charset="2"/>
+              <a:buChar char="ü"/>
+            </a:pPr>
+            <a:r>
+              <a:rPr lang="en-US" sz="2000" dirty="0" err="1" smtClean="0"/>
+              <a:t>EnumerateDirectories</a:t>
+            </a:r>
+            <a:endParaRPr lang="en-US" sz="2000" dirty="0"/>
           </a:p>
         </p:txBody>
       </p:sp>
     </p:spTree>
     <p:extLst>
       <p:ext uri="{BB962C8B-B14F-4D97-AF65-F5344CB8AC3E}">
-        <p14:creationId xmlns:p14="http://schemas.microsoft.com/office/powerpoint/2010/main" val="3762960559"/>
+        <p14:creationId xmlns:p14="http://schemas.microsoft.com/office/powerpoint/2010/main" val="742885836"/>
       </p:ext>
     </p:extLst>
   </p:cSld>
@@ -6233,261 +7384,224 @@
       </p:grpSpPr>
       <p:sp>
         <p:nvSpPr>
-          <p:cNvPr id="2" name="Title 1"/>
-          <p:cNvSpPr>
-            <a:spLocks noGrp="1"/>
-          </p:cNvSpPr>
-          <p:nvPr>
-            <p:ph type="title"/>
-          </p:nvPr>
-        </p:nvSpPr>
-        <p:spPr/>
-        <p:txBody>
-          <a:bodyPr/>
-          <a:lstStyle/>
-          <a:p>
-            <a:r>
-              <a:rPr lang="en-US" dirty="0" smtClean="0">
-                <a:latin typeface="Times New Roman" charset="0"/>
-              </a:rPr>
-              <a:t>File Streams</a:t>
-            </a:r>
-            <a:endParaRPr lang="en-US" dirty="0"/>
-          </a:p>
-        </p:txBody>
-      </p:sp>
-      <p:sp>
-        <p:nvSpPr>
-          <p:cNvPr id="3" name="Content Placeholder 2"/>
-          <p:cNvSpPr>
-            <a:spLocks noGrp="1"/>
-          </p:cNvSpPr>
-          <p:nvPr>
-            <p:ph idx="1"/>
-          </p:nvPr>
-        </p:nvSpPr>
-        <p:spPr/>
-        <p:txBody>
-          <a:bodyPr>
-            <a:normAutofit lnSpcReduction="10000"/>
+          <p:cNvPr id="4" name="Rectangle 3"/>
+          <p:cNvSpPr/>
+          <p:nvPr/>
+        </p:nvSpPr>
+        <p:spPr>
+          <a:xfrm>
+            <a:off x="875352" y="1006339"/>
+            <a:ext cx="7105802" cy="5078314"/>
+          </a:xfrm>
+          <a:prstGeom prst="rect">
+            <a:avLst/>
+          </a:prstGeom>
+        </p:spPr>
+        <p:txBody>
+          <a:bodyPr wrap="square">
+            <a:spAutoFit/>
           </a:bodyPr>
           <a:lstStyle/>
           <a:p>
-            <a:pPr>
-              <a:lnSpc>
-                <a:spcPct val="90000"/>
-              </a:lnSpc>
-              <a:spcBef>
-                <a:spcPct val="50000"/>
-              </a:spcBef>
-            </a:pPr>
-            <a:r>
-              <a:rPr lang="en-US" dirty="0" smtClean="0">
-                <a:latin typeface="Times New Roman" charset="0"/>
-              </a:rPr>
-              <a:t>Several abstract classes for dealing with files</a:t>
-            </a:r>
-          </a:p>
-          <a:p>
-            <a:pPr lvl="2">
-              <a:lnSpc>
-                <a:spcPct val="90000"/>
-              </a:lnSpc>
-              <a:spcBef>
-                <a:spcPct val="50000"/>
-              </a:spcBef>
-            </a:pPr>
-            <a:r>
-              <a:rPr lang="en-US" sz="2600" dirty="0" smtClean="0">
-                <a:latin typeface="Times New Roman" charset="0"/>
-              </a:rPr>
-              <a:t>Stream, </a:t>
-            </a:r>
-            <a:r>
-              <a:rPr lang="en-US" sz="2600" dirty="0" err="1" smtClean="0">
-                <a:latin typeface="Times New Roman" charset="0"/>
-              </a:rPr>
-              <a:t>TextWriter</a:t>
-            </a:r>
-            <a:r>
-              <a:rPr lang="en-US" sz="2600" dirty="0" smtClean="0">
-                <a:latin typeface="Times New Roman" charset="0"/>
-              </a:rPr>
-              <a:t>, and </a:t>
-            </a:r>
-            <a:r>
-              <a:rPr lang="en-US" sz="2600" dirty="0" err="1" smtClean="0">
-                <a:latin typeface="Times New Roman" charset="0"/>
-              </a:rPr>
-              <a:t>TextReader</a:t>
-            </a:r>
-            <a:r>
-              <a:rPr lang="en-US" dirty="0" smtClean="0">
-                <a:latin typeface="Times New Roman" charset="0"/>
-              </a:rPr>
-              <a:t> </a:t>
-            </a:r>
-          </a:p>
-          <a:p>
-            <a:pPr>
-              <a:lnSpc>
-                <a:spcPct val="90000"/>
-              </a:lnSpc>
-              <a:spcBef>
-                <a:spcPct val="50000"/>
-              </a:spcBef>
-            </a:pPr>
-            <a:r>
-              <a:rPr lang="en-US" dirty="0" smtClean="0">
-                <a:latin typeface="Times New Roman" charset="0"/>
-              </a:rPr>
-              <a:t>Stream classes provide generic methods for dealing with input/output</a:t>
-            </a:r>
-          </a:p>
-          <a:p>
-            <a:pPr lvl="1">
-              <a:lnSpc>
-                <a:spcPct val="90000"/>
-              </a:lnSpc>
-              <a:spcBef>
-                <a:spcPct val="50000"/>
-              </a:spcBef>
-            </a:pPr>
-            <a:r>
-              <a:rPr lang="en-US" sz="2600" dirty="0" err="1" smtClean="0">
-                <a:latin typeface="Times New Roman" charset="0"/>
-              </a:rPr>
-              <a:t>IO.Stream</a:t>
-            </a:r>
-            <a:r>
-              <a:rPr lang="en-US" sz="2600" dirty="0" smtClean="0">
-                <a:latin typeface="Times New Roman" charset="0"/>
-              </a:rPr>
-              <a:t> class and its subclasses</a:t>
-            </a:r>
-            <a:r>
-              <a:rPr lang="en-US" sz="2600" dirty="0" smtClean="0">
-                <a:latin typeface="Times New Roman" charset="0"/>
-                <a:cs typeface="Times New Roman" charset="0"/>
-              </a:rPr>
-              <a:t> </a:t>
-            </a:r>
-            <a:r>
-              <a:rPr lang="en-US" dirty="0">
-                <a:latin typeface="Times New Roman" charset="0"/>
-              </a:rPr>
-              <a:t>– </a:t>
-            </a:r>
-            <a:r>
-              <a:rPr lang="en-US" sz="2600" dirty="0" smtClean="0">
-                <a:latin typeface="Times New Roman" charset="0"/>
-              </a:rPr>
-              <a:t>byte-level data</a:t>
-            </a:r>
-          </a:p>
-          <a:p>
-            <a:pPr lvl="1">
-              <a:lnSpc>
-                <a:spcPct val="90000"/>
-              </a:lnSpc>
-              <a:spcBef>
-                <a:spcPct val="50000"/>
-              </a:spcBef>
-            </a:pPr>
-            <a:r>
-              <a:rPr lang="en-US" sz="2600" dirty="0" err="1" smtClean="0">
-                <a:latin typeface="Times New Roman" charset="0"/>
-              </a:rPr>
-              <a:t>IO.TextWriter</a:t>
-            </a:r>
-            <a:r>
-              <a:rPr lang="en-US" sz="2600" dirty="0" smtClean="0">
-                <a:latin typeface="Times New Roman" charset="0"/>
-              </a:rPr>
-              <a:t> and </a:t>
-            </a:r>
-            <a:r>
-              <a:rPr lang="en-US" sz="2600" dirty="0" err="1" smtClean="0">
-                <a:latin typeface="Times New Roman" charset="0"/>
-              </a:rPr>
-              <a:t>IO.TextReader</a:t>
-            </a:r>
-            <a:r>
-              <a:rPr lang="en-US" sz="2600" dirty="0" smtClean="0">
-                <a:latin typeface="Times New Roman" charset="0"/>
-                <a:cs typeface="Times New Roman" charset="0"/>
-              </a:rPr>
-              <a:t> </a:t>
-            </a:r>
-            <a:r>
-              <a:rPr lang="en-US" dirty="0">
-                <a:latin typeface="Times New Roman" charset="0"/>
-              </a:rPr>
-              <a:t>– </a:t>
-            </a:r>
-            <a:r>
-              <a:rPr lang="en-US" sz="2600" dirty="0" smtClean="0">
-                <a:latin typeface="Times New Roman" charset="0"/>
-              </a:rPr>
-              <a:t>data in a text (readable) format     </a:t>
-            </a:r>
-          </a:p>
-          <a:p>
-            <a:pPr lvl="2">
-              <a:lnSpc>
-                <a:spcPct val="90000"/>
-              </a:lnSpc>
-              <a:spcBef>
-                <a:spcPct val="50000"/>
-              </a:spcBef>
-            </a:pPr>
-            <a:r>
-              <a:rPr lang="en-US" dirty="0" err="1">
-                <a:latin typeface="Times New Roman" charset="0"/>
-              </a:rPr>
-              <a:t>StreamReader</a:t>
-            </a:r>
-            <a:r>
-              <a:rPr lang="en-US" dirty="0">
-                <a:latin typeface="Times New Roman" charset="0"/>
-              </a:rPr>
-              <a:t> and </a:t>
-            </a:r>
-            <a:r>
-              <a:rPr lang="en-US" dirty="0" err="1">
-                <a:latin typeface="Times New Roman" charset="0"/>
-              </a:rPr>
-              <a:t>StreamWriter</a:t>
-            </a:r>
-            <a:r>
-              <a:rPr lang="en-US" dirty="0">
-                <a:latin typeface="Times New Roman" charset="0"/>
-              </a:rPr>
-              <a:t> derived classes of </a:t>
-            </a:r>
-            <a:r>
-              <a:rPr lang="en-US" dirty="0" err="1">
-                <a:latin typeface="Times New Roman" charset="0"/>
-              </a:rPr>
-              <a:t>IO.TextWriter</a:t>
-            </a:r>
-            <a:r>
-              <a:rPr lang="en-US" dirty="0">
-                <a:latin typeface="Times New Roman" charset="0"/>
-              </a:rPr>
-              <a:t> and </a:t>
-            </a:r>
-            <a:r>
-              <a:rPr lang="en-US" dirty="0" err="1">
-                <a:latin typeface="Times New Roman" charset="0"/>
-              </a:rPr>
-              <a:t>IO.TextReader</a:t>
-            </a:r>
-            <a:endParaRPr lang="en-US" dirty="0">
-              <a:latin typeface="Times New Roman" charset="0"/>
-            </a:endParaRPr>
-          </a:p>
-          <a:p>
+            <a:r>
+              <a:rPr lang="en-US" dirty="0" smtClean="0"/>
+              <a:t>string </a:t>
+            </a:r>
+            <a:r>
+              <a:rPr lang="en-US" dirty="0" err="1" smtClean="0"/>
+              <a:t>GetCurrentDirectory</a:t>
+            </a:r>
+            <a:r>
+              <a:rPr lang="en-US" dirty="0" smtClean="0"/>
+              <a:t> ();</a:t>
+            </a:r>
+          </a:p>
+          <a:p>
+            <a:r>
+              <a:rPr lang="en-US" dirty="0" smtClean="0"/>
+              <a:t>void   </a:t>
+            </a:r>
+            <a:r>
+              <a:rPr lang="en-US" dirty="0" err="1" smtClean="0"/>
+              <a:t>SetCurrentDirectory</a:t>
+            </a:r>
+            <a:r>
+              <a:rPr lang="en-US" dirty="0" smtClean="0"/>
+              <a:t> (string path);</a:t>
+            </a:r>
+          </a:p>
+          <a:p>
+            <a:endParaRPr lang="en-US" dirty="0" smtClean="0"/>
+          </a:p>
+          <a:p>
+            <a:r>
+              <a:rPr lang="en-US" dirty="0" smtClean="0"/>
+              <a:t>DirectoryInfo </a:t>
+            </a:r>
+            <a:r>
+              <a:rPr lang="en-US" dirty="0" err="1" smtClean="0"/>
+              <a:t>CreateDirectory</a:t>
+            </a:r>
+            <a:r>
+              <a:rPr lang="en-US" dirty="0" smtClean="0"/>
+              <a:t>  (string path);</a:t>
+            </a:r>
+          </a:p>
+          <a:p>
+            <a:r>
+              <a:rPr lang="en-US" dirty="0" smtClean="0"/>
+              <a:t>DirectoryInfo </a:t>
+            </a:r>
+            <a:r>
+              <a:rPr lang="en-US" dirty="0" err="1" smtClean="0"/>
+              <a:t>GetParent</a:t>
+            </a:r>
+            <a:r>
+              <a:rPr lang="en-US" dirty="0" smtClean="0"/>
+              <a:t>        (string path);</a:t>
+            </a:r>
+          </a:p>
+          <a:p>
+            <a:r>
+              <a:rPr lang="en-US" dirty="0" smtClean="0"/>
+              <a:t>string        </a:t>
+            </a:r>
+            <a:r>
+              <a:rPr lang="en-US" dirty="0" err="1" smtClean="0"/>
+              <a:t>GetDirectoryRoot</a:t>
+            </a:r>
+            <a:r>
+              <a:rPr lang="en-US" dirty="0" smtClean="0"/>
+              <a:t> (string path);</a:t>
+            </a:r>
+          </a:p>
+          <a:p>
+            <a:endParaRPr lang="en-US" dirty="0" smtClean="0"/>
+          </a:p>
+          <a:p>
+            <a:r>
+              <a:rPr lang="en-US" dirty="0" smtClean="0"/>
+              <a:t>string[] </a:t>
+            </a:r>
+            <a:r>
+              <a:rPr lang="en-US" dirty="0" err="1" smtClean="0"/>
+              <a:t>GetLogicalDrives</a:t>
+            </a:r>
+            <a:r>
+              <a:rPr lang="en-US" dirty="0" smtClean="0"/>
+              <a:t>();</a:t>
+            </a:r>
+          </a:p>
+          <a:p>
+            <a:endParaRPr lang="en-US" dirty="0" smtClean="0"/>
+          </a:p>
+          <a:p>
+            <a:r>
+              <a:rPr lang="en-US" dirty="0" smtClean="0"/>
+              <a:t>// The following methods all return full paths:</a:t>
+            </a:r>
+          </a:p>
+          <a:p>
+            <a:endParaRPr lang="en-US" dirty="0" smtClean="0"/>
+          </a:p>
+          <a:p>
+            <a:r>
+              <a:rPr lang="en-US" dirty="0" smtClean="0"/>
+              <a:t>string[] </a:t>
+            </a:r>
+            <a:r>
+              <a:rPr lang="en-US" dirty="0" err="1" smtClean="0"/>
+              <a:t>GetFiles</a:t>
+            </a:r>
+            <a:r>
+              <a:rPr lang="en-US" dirty="0" smtClean="0"/>
+              <a:t>             (string path);</a:t>
+            </a:r>
+          </a:p>
+          <a:p>
+            <a:r>
+              <a:rPr lang="en-US" dirty="0" smtClean="0"/>
+              <a:t>string[] </a:t>
+            </a:r>
+            <a:r>
+              <a:rPr lang="en-US" dirty="0" err="1" smtClean="0"/>
+              <a:t>GetDirectories</a:t>
+            </a:r>
+            <a:r>
+              <a:rPr lang="en-US" dirty="0" smtClean="0"/>
+              <a:t>       (string path);</a:t>
+            </a:r>
+          </a:p>
+          <a:p>
+            <a:r>
+              <a:rPr lang="en-US" dirty="0" smtClean="0"/>
+              <a:t>string[] </a:t>
+            </a:r>
+            <a:r>
+              <a:rPr lang="en-US" dirty="0" err="1" smtClean="0"/>
+              <a:t>GetFileSystemEntries</a:t>
+            </a:r>
+            <a:r>
+              <a:rPr lang="en-US" dirty="0" smtClean="0"/>
+              <a:t> (string path);</a:t>
+            </a:r>
+          </a:p>
+          <a:p>
+            <a:endParaRPr lang="en-US" dirty="0" smtClean="0"/>
+          </a:p>
+          <a:p>
+            <a:r>
+              <a:rPr lang="en-US" dirty="0" err="1" smtClean="0"/>
+              <a:t>IEnumerable</a:t>
+            </a:r>
+            <a:r>
+              <a:rPr lang="en-US" dirty="0" smtClean="0"/>
+              <a:t>&lt;string&gt; </a:t>
+            </a:r>
+            <a:r>
+              <a:rPr lang="en-US" dirty="0" err="1" smtClean="0"/>
+              <a:t>EnumerateFiles</a:t>
+            </a:r>
+            <a:r>
+              <a:rPr lang="en-US" dirty="0" smtClean="0"/>
+              <a:t>             (string path);</a:t>
+            </a:r>
+          </a:p>
+          <a:p>
+            <a:r>
+              <a:rPr lang="en-US" dirty="0" err="1" smtClean="0"/>
+              <a:t>IEnumerable</a:t>
+            </a:r>
+            <a:r>
+              <a:rPr lang="en-US" dirty="0" smtClean="0"/>
+              <a:t>&lt;string&gt; </a:t>
+            </a:r>
+            <a:r>
+              <a:rPr lang="en-US" dirty="0" err="1" smtClean="0"/>
+              <a:t>EnumerateDirectories</a:t>
+            </a:r>
+            <a:r>
+              <a:rPr lang="en-US" dirty="0" smtClean="0"/>
+              <a:t>       (string path);</a:t>
+            </a:r>
+          </a:p>
+          <a:p>
+            <a:r>
+              <a:rPr lang="en-US" dirty="0" err="1" smtClean="0"/>
+              <a:t>IEnumerable</a:t>
+            </a:r>
+            <a:r>
+              <a:rPr lang="en-US" dirty="0" smtClean="0"/>
+              <a:t>&lt;string&gt; </a:t>
+            </a:r>
+            <a:r>
+              <a:rPr lang="en-US" dirty="0" err="1" smtClean="0"/>
+              <a:t>EnumerateFileSystemEntries</a:t>
+            </a:r>
+            <a:r>
+              <a:rPr lang="en-US" dirty="0" smtClean="0"/>
+              <a:t> (string path);</a:t>
+            </a:r>
             <a:endParaRPr lang="en-US" dirty="0"/>
           </a:p>
         </p:txBody>
@@ -6495,7 +7609,7 @@
     </p:spTree>
     <p:extLst>
       <p:ext uri="{BB962C8B-B14F-4D97-AF65-F5344CB8AC3E}">
-        <p14:creationId xmlns:p14="http://schemas.microsoft.com/office/powerpoint/2010/main" val="3346148235"/>
+        <p14:creationId xmlns:p14="http://schemas.microsoft.com/office/powerpoint/2010/main" val="2243132912"/>
       </p:ext>
     </p:extLst>
   </p:cSld>

</xml_diff>